<commit_message>
Lesson 26 - DQN.
Presentation and files for DQN and DQN+fixTarget algorithms.
</commit_message>
<xml_diff>
--- a/RL/02 - Deep Reinforcement Learning/02 - 02 Deep Q-Network (DQN) алгоритм/Deep Q network (DQN).pptx
+++ b/RL/02 - Deep Reinforcement Learning/02 - 02 Deep Q-Network (DQN) алгоритм/Deep Q network (DQN).pptx
@@ -18016,8 +18016,8 @@
           </p:sp>
         </mc:Fallback>
       </mc:AlternateContent>
-      <mc:AlternateContent xmlns:mc="http://schemas.openxmlformats.org/markup-compatibility/2006">
-        <mc:Choice xmlns:a14="http://schemas.microsoft.com/office/drawing/2010/main" Requires="a14">
+      <mc:AlternateContent xmlns:mc="http://schemas.openxmlformats.org/markup-compatibility/2006" xmlns:a14="http://schemas.microsoft.com/office/drawing/2010/main">
+        <mc:Choice Requires="a14">
           <p:sp>
             <p:nvSpPr>
               <p:cNvPr id="12" name="TextBox 11">
@@ -18974,7 +18974,7 @@
             </p:txBody>
           </p:sp>
         </mc:Choice>
-        <mc:Fallback>
+        <mc:Fallback xmlns="">
           <p:sp>
             <p:nvSpPr>
               <p:cNvPr id="12" name="TextBox 11">
@@ -19082,8 +19082,8 @@
           </a:p>
         </p:txBody>
       </p:sp>
-      <mc:AlternateContent xmlns:mc="http://schemas.openxmlformats.org/markup-compatibility/2006">
-        <mc:Choice xmlns:a14="http://schemas.microsoft.com/office/drawing/2010/main" Requires="a14">
+      <mc:AlternateContent xmlns:mc="http://schemas.openxmlformats.org/markup-compatibility/2006" xmlns:a14="http://schemas.microsoft.com/office/drawing/2010/main">
+        <mc:Choice Requires="a14">
           <p:sp>
             <p:nvSpPr>
               <p:cNvPr id="6" name="Google Shape;311;p57">
@@ -20590,7 +20590,7 @@
             </p:txBody>
           </p:sp>
         </mc:Choice>
-        <mc:Fallback>
+        <mc:Fallback xmlns="">
           <p:sp>
             <p:nvSpPr>
               <p:cNvPr id="6" name="Google Shape;311;p57">
@@ -20735,8 +20735,8 @@
           </a:prstGeom>
         </p:spPr>
       </p:pic>
-      <mc:AlternateContent xmlns:mc="http://schemas.openxmlformats.org/markup-compatibility/2006">
-        <mc:Choice xmlns:a14="http://schemas.microsoft.com/office/drawing/2010/main" Requires="a14">
+      <mc:AlternateContent xmlns:mc="http://schemas.openxmlformats.org/markup-compatibility/2006" xmlns:a14="http://schemas.microsoft.com/office/drawing/2010/main">
+        <mc:Choice Requires="a14">
           <p:sp>
             <p:nvSpPr>
               <p:cNvPr id="7" name="TextBox 6">
@@ -20996,7 +20996,7 @@
             </p:txBody>
           </p:sp>
         </mc:Choice>
-        <mc:Fallback>
+        <mc:Fallback xmlns="">
           <p:sp>
             <p:nvSpPr>
               <p:cNvPr id="7" name="TextBox 6">
@@ -21109,8 +21109,8 @@
           </a:p>
         </p:txBody>
       </p:sp>
-      <mc:AlternateContent xmlns:mc="http://schemas.openxmlformats.org/markup-compatibility/2006">
-        <mc:Choice xmlns:a14="http://schemas.microsoft.com/office/drawing/2010/main" Requires="a14">
+      <mc:AlternateContent xmlns:mc="http://schemas.openxmlformats.org/markup-compatibility/2006" xmlns:a14="http://schemas.microsoft.com/office/drawing/2010/main">
+        <mc:Choice Requires="a14">
           <p:sp>
             <p:nvSpPr>
               <p:cNvPr id="6" name="Google Shape;311;p57">
@@ -23018,7 +23018,7 @@
             </p:txBody>
           </p:sp>
         </mc:Choice>
-        <mc:Fallback>
+        <mc:Fallback xmlns="">
           <p:sp>
             <p:nvSpPr>
               <p:cNvPr id="6" name="Google Shape;311;p57">
@@ -24817,300 +24817,217 @@
                       </a:rPr>
                       <m:t>=</m:t>
                     </m:r>
-                    <m:f>
-                      <m:fPr>
+                    <m:sSup>
+                      <m:sSupPr>
                         <m:ctrlPr>
-                          <a:rPr lang="en-US" sz="1400" b="0" i="1" smtClean="0">
+                          <a:rPr lang="en-US" sz="1400" i="1">
                             <a:solidFill>
                               <a:srgbClr val="000000"/>
                             </a:solidFill>
                             <a:latin typeface="Cambria Math" panose="02040503050406030204" pitchFamily="18" charset="0"/>
                           </a:rPr>
                         </m:ctrlPr>
-                      </m:fPr>
-                      <m:num>
-                        <m:r>
-                          <a:rPr lang="en-US" sz="1400" b="0" i="1" smtClean="0">
-                            <a:solidFill>
-                              <a:srgbClr val="000000"/>
-                            </a:solidFill>
-                            <a:latin typeface="Cambria Math" panose="02040503050406030204" pitchFamily="18" charset="0"/>
-                          </a:rPr>
-                          <m:t>1</m:t>
-                        </m:r>
-                      </m:num>
-                      <m:den>
-                        <m:r>
-                          <a:rPr lang="en-US" sz="1400" b="0" i="1" smtClean="0">
-                            <a:solidFill>
-                              <a:srgbClr val="000000"/>
-                            </a:solidFill>
-                            <a:latin typeface="Cambria Math" panose="02040503050406030204" pitchFamily="18" charset="0"/>
-                          </a:rPr>
-                          <m:t>𝑛</m:t>
-                        </m:r>
-                      </m:den>
-                    </m:f>
-                    <m:nary>
-                      <m:naryPr>
-                        <m:chr m:val="∑"/>
-                        <m:ctrlPr>
-                          <a:rPr lang="en-US" sz="1400" b="0" i="1" smtClean="0">
-                            <a:solidFill>
-                              <a:srgbClr val="000000"/>
-                            </a:solidFill>
-                            <a:latin typeface="Cambria Math" panose="02040503050406030204" pitchFamily="18" charset="0"/>
-                          </a:rPr>
-                        </m:ctrlPr>
-                      </m:naryPr>
-                      <m:sub>
-                        <m:r>
-                          <m:rPr>
-                            <m:brk m:alnAt="23"/>
-                          </m:rPr>
-                          <a:rPr lang="en-US" sz="1400" b="0" i="1" smtClean="0">
-                            <a:solidFill>
-                              <a:srgbClr val="000000"/>
-                            </a:solidFill>
-                            <a:latin typeface="Cambria Math" panose="02040503050406030204" pitchFamily="18" charset="0"/>
-                          </a:rPr>
-                          <m:t>𝑖</m:t>
-                        </m:r>
-                        <m:r>
-                          <a:rPr lang="en-US" sz="1400" b="0" i="1" smtClean="0">
-                            <a:solidFill>
-                              <a:srgbClr val="000000"/>
-                            </a:solidFill>
-                            <a:latin typeface="Cambria Math" panose="02040503050406030204" pitchFamily="18" charset="0"/>
-                          </a:rPr>
-                          <m:t>=1</m:t>
-                        </m:r>
-                      </m:sub>
-                      <m:sup>
-                        <m:r>
-                          <a:rPr lang="en-US" sz="1400" b="0" i="1" smtClean="0">
-                            <a:solidFill>
-                              <a:srgbClr val="000000"/>
-                            </a:solidFill>
-                            <a:latin typeface="Cambria Math" panose="02040503050406030204" pitchFamily="18" charset="0"/>
-                          </a:rPr>
-                          <m:t>𝑛</m:t>
-                        </m:r>
-                      </m:sup>
+                      </m:sSupPr>
                       <m:e>
-                        <m:sSup>
-                          <m:sSupPr>
+                        <m:d>
+                          <m:dPr>
                             <m:ctrlPr>
-                              <a:rPr lang="en-US" sz="1400" b="0" i="1" smtClean="0">
+                              <a:rPr lang="en-US" sz="1400" i="1">
                                 <a:solidFill>
                                   <a:srgbClr val="000000"/>
                                 </a:solidFill>
                                 <a:latin typeface="Cambria Math" panose="02040503050406030204" pitchFamily="18" charset="0"/>
                               </a:rPr>
                             </m:ctrlPr>
-                          </m:sSupPr>
+                          </m:dPr>
                           <m:e>
-                            <m:d>
-                              <m:dPr>
+                            <m:sSub>
+                              <m:sSubPr>
                                 <m:ctrlPr>
-                                  <a:rPr lang="en-US" sz="1400" b="0" i="1" smtClean="0">
+                                  <a:rPr lang="en-US" sz="1400" i="1">
                                     <a:solidFill>
                                       <a:srgbClr val="000000"/>
                                     </a:solidFill>
                                     <a:latin typeface="Cambria Math" panose="02040503050406030204" pitchFamily="18" charset="0"/>
                                   </a:rPr>
                                 </m:ctrlPr>
-                              </m:dPr>
+                              </m:sSubPr>
                               <m:e>
-                                <m:sSub>
-                                  <m:sSubPr>
-                                    <m:ctrlPr>
-                                      <a:rPr lang="en-US" sz="1400" b="0" i="1" smtClean="0">
-                                        <a:solidFill>
-                                          <a:srgbClr val="000000"/>
-                                        </a:solidFill>
-                                        <a:latin typeface="Cambria Math" panose="02040503050406030204" pitchFamily="18" charset="0"/>
-                                      </a:rPr>
-                                    </m:ctrlPr>
-                                  </m:sSubPr>
-                                  <m:e>
-                                    <m:r>
-                                      <a:rPr lang="en-US" sz="1400" b="0" i="1" smtClean="0">
-                                        <a:solidFill>
-                                          <a:srgbClr val="000000"/>
-                                        </a:solidFill>
-                                        <a:latin typeface="Cambria Math" panose="02040503050406030204" pitchFamily="18" charset="0"/>
-                                      </a:rPr>
-                                      <m:t>𝑦</m:t>
-                                    </m:r>
-                                  </m:e>
-                                  <m:sub>
-                                    <m:r>
-                                      <a:rPr lang="en-US" sz="1400" b="0" i="1" smtClean="0">
-                                        <a:solidFill>
-                                          <a:srgbClr val="000000"/>
-                                        </a:solidFill>
-                                        <a:latin typeface="Cambria Math" panose="02040503050406030204" pitchFamily="18" charset="0"/>
-                                      </a:rPr>
-                                      <m:t>𝑖</m:t>
-                                    </m:r>
-                                  </m:sub>
-                                </m:sSub>
                                 <m:r>
-                                  <a:rPr lang="en-US" sz="1400" b="0" i="1" smtClean="0">
+                                  <a:rPr lang="en-US" sz="1400" i="1">
                                     <a:solidFill>
                                       <a:srgbClr val="000000"/>
                                     </a:solidFill>
                                     <a:latin typeface="Cambria Math" panose="02040503050406030204" pitchFamily="18" charset="0"/>
                                   </a:rPr>
-                                  <m:t>−</m:t>
+                                  <m:t>𝑦</m:t>
                                 </m:r>
-                                <m:sSup>
-                                  <m:sSupPr>
-                                    <m:ctrlPr>
-                                      <a:rPr lang="en-US" sz="1400" b="0" i="1" smtClean="0">
-                                        <a:solidFill>
-                                          <a:srgbClr val="000000"/>
-                                        </a:solidFill>
-                                        <a:latin typeface="Cambria Math" panose="02040503050406030204" pitchFamily="18" charset="0"/>
-                                      </a:rPr>
-                                    </m:ctrlPr>
-                                  </m:sSupPr>
-                                  <m:e>
-                                    <m:r>
-                                      <a:rPr lang="en-US" sz="1400" b="0" i="1" smtClean="0">
-                                        <a:solidFill>
-                                          <a:srgbClr val="000000"/>
-                                        </a:solidFill>
-                                        <a:latin typeface="Cambria Math" panose="02040503050406030204" pitchFamily="18" charset="0"/>
-                                      </a:rPr>
-                                      <m:t>𝑄</m:t>
-                                    </m:r>
-                                  </m:e>
-                                  <m:sup>
-                                    <m:r>
-                                      <a:rPr lang="en-US" sz="1400" b="0" i="1" smtClean="0">
-                                        <a:solidFill>
-                                          <a:srgbClr val="000000"/>
-                                        </a:solidFill>
-                                        <a:latin typeface="Cambria Math" panose="02040503050406030204" pitchFamily="18" charset="0"/>
-                                      </a:rPr>
-                                      <m:t>𝜃</m:t>
-                                    </m:r>
-                                  </m:sup>
-                                </m:sSup>
+                              </m:e>
+                              <m:sub>
                                 <m:r>
-                                  <a:rPr lang="en-US" sz="1400" b="0" i="1" smtClean="0">
+                                  <a:rPr lang="en-US" sz="1400" i="1">
                                     <a:solidFill>
                                       <a:srgbClr val="000000"/>
                                     </a:solidFill>
                                     <a:latin typeface="Cambria Math" panose="02040503050406030204" pitchFamily="18" charset="0"/>
                                   </a:rPr>
-                                  <m:t>(</m:t>
+                                  <m:t>𝑖</m:t>
                                 </m:r>
-                                <m:sSub>
-                                  <m:sSubPr>
-                                    <m:ctrlPr>
-                                      <a:rPr lang="en-US" sz="1400" b="0" i="1" smtClean="0">
-                                        <a:solidFill>
-                                          <a:srgbClr val="000000"/>
-                                        </a:solidFill>
-                                        <a:latin typeface="Cambria Math" panose="02040503050406030204" pitchFamily="18" charset="0"/>
-                                      </a:rPr>
-                                    </m:ctrlPr>
-                                  </m:sSubPr>
-                                  <m:e>
-                                    <m:r>
-                                      <a:rPr lang="en-US" sz="1400" b="0" i="1" smtClean="0">
-                                        <a:solidFill>
-                                          <a:srgbClr val="000000"/>
-                                        </a:solidFill>
-                                        <a:latin typeface="Cambria Math" panose="02040503050406030204" pitchFamily="18" charset="0"/>
-                                      </a:rPr>
-                                      <m:t>𝑠</m:t>
-                                    </m:r>
-                                  </m:e>
-                                  <m:sub>
-                                    <m:r>
-                                      <a:rPr lang="en-US" sz="1400" b="0" i="1" smtClean="0">
-                                        <a:solidFill>
-                                          <a:srgbClr val="000000"/>
-                                        </a:solidFill>
-                                        <a:latin typeface="Cambria Math" panose="02040503050406030204" pitchFamily="18" charset="0"/>
-                                      </a:rPr>
-                                      <m:t>𝑖</m:t>
-                                    </m:r>
-                                  </m:sub>
-                                </m:sSub>
-                                <m:r>
-                                  <a:rPr lang="en-US" sz="1400" b="0" i="1" smtClean="0">
+                              </m:sub>
+                            </m:sSub>
+                            <m:r>
+                              <a:rPr lang="en-US" sz="1400" i="1">
+                                <a:solidFill>
+                                  <a:srgbClr val="000000"/>
+                                </a:solidFill>
+                                <a:latin typeface="Cambria Math" panose="02040503050406030204" pitchFamily="18" charset="0"/>
+                              </a:rPr>
+                              <m:t>−</m:t>
+                            </m:r>
+                            <m:sSup>
+                              <m:sSupPr>
+                                <m:ctrlPr>
+                                  <a:rPr lang="en-US" sz="1400" i="1">
                                     <a:solidFill>
                                       <a:srgbClr val="000000"/>
                                     </a:solidFill>
                                     <a:latin typeface="Cambria Math" panose="02040503050406030204" pitchFamily="18" charset="0"/>
                                   </a:rPr>
-                                  <m:t>,</m:t>
-                                </m:r>
-                                <m:sSub>
-                                  <m:sSubPr>
-                                    <m:ctrlPr>
-                                      <a:rPr lang="en-US" sz="1400" i="1">
-                                        <a:solidFill>
-                                          <a:srgbClr val="000000"/>
-                                        </a:solidFill>
-                                        <a:latin typeface="Cambria Math" panose="02040503050406030204" pitchFamily="18" charset="0"/>
-                                      </a:rPr>
-                                    </m:ctrlPr>
-                                  </m:sSubPr>
-                                  <m:e>
-                                    <m:r>
-                                      <a:rPr lang="en-US" sz="1400" b="0" i="1" smtClean="0">
-                                        <a:solidFill>
-                                          <a:srgbClr val="000000"/>
-                                        </a:solidFill>
-                                        <a:latin typeface="Cambria Math" panose="02040503050406030204" pitchFamily="18" charset="0"/>
-                                      </a:rPr>
-                                      <m:t>𝑎</m:t>
-                                    </m:r>
-                                  </m:e>
-                                  <m:sub>
-                                    <m:r>
-                                      <a:rPr lang="en-US" sz="1400" i="1">
-                                        <a:solidFill>
-                                          <a:srgbClr val="000000"/>
-                                        </a:solidFill>
-                                        <a:latin typeface="Cambria Math" panose="02040503050406030204" pitchFamily="18" charset="0"/>
-                                      </a:rPr>
-                                      <m:t>𝑖</m:t>
-                                    </m:r>
-                                  </m:sub>
-                                </m:sSub>
+                                </m:ctrlPr>
+                              </m:sSupPr>
+                              <m:e>
                                 <m:r>
-                                  <a:rPr lang="en-US" sz="1400" b="0" i="1" smtClean="0">
+                                  <a:rPr lang="en-US" sz="1400" i="1">
                                     <a:solidFill>
                                       <a:srgbClr val="000000"/>
                                     </a:solidFill>
                                     <a:latin typeface="Cambria Math" panose="02040503050406030204" pitchFamily="18" charset="0"/>
                                   </a:rPr>
-                                  <m:t>)</m:t>
+                                  <m:t>𝑄</m:t>
                                 </m:r>
                               </m:e>
-                            </m:d>
-                          </m:e>
-                          <m:sup>
+                              <m:sup>
+                                <m:r>
+                                  <a:rPr lang="en-US" sz="1400" i="1">
+                                    <a:solidFill>
+                                      <a:srgbClr val="000000"/>
+                                    </a:solidFill>
+                                    <a:latin typeface="Cambria Math" panose="02040503050406030204" pitchFamily="18" charset="0"/>
+                                  </a:rPr>
+                                  <m:t>𝜃</m:t>
+                                </m:r>
+                              </m:sup>
+                            </m:sSup>
                             <m:r>
-                              <a:rPr lang="en-US" sz="1400" b="0" i="1" smtClean="0">
+                              <a:rPr lang="en-US" sz="1400" i="1">
                                 <a:solidFill>
                                   <a:srgbClr val="000000"/>
                                 </a:solidFill>
                                 <a:latin typeface="Cambria Math" panose="02040503050406030204" pitchFamily="18" charset="0"/>
                               </a:rPr>
-                              <m:t>2</m:t>
+                              <m:t>(</m:t>
                             </m:r>
-                          </m:sup>
-                        </m:sSup>
+                            <m:sSub>
+                              <m:sSubPr>
+                                <m:ctrlPr>
+                                  <a:rPr lang="en-US" sz="1400" i="1">
+                                    <a:solidFill>
+                                      <a:srgbClr val="000000"/>
+                                    </a:solidFill>
+                                    <a:latin typeface="Cambria Math" panose="02040503050406030204" pitchFamily="18" charset="0"/>
+                                  </a:rPr>
+                                </m:ctrlPr>
+                              </m:sSubPr>
+                              <m:e>
+                                <m:r>
+                                  <a:rPr lang="en-US" sz="1400" i="1">
+                                    <a:solidFill>
+                                      <a:srgbClr val="000000"/>
+                                    </a:solidFill>
+                                    <a:latin typeface="Cambria Math" panose="02040503050406030204" pitchFamily="18" charset="0"/>
+                                  </a:rPr>
+                                  <m:t>𝑠</m:t>
+                                </m:r>
+                              </m:e>
+                              <m:sub>
+                                <m:r>
+                                  <a:rPr lang="en-US" sz="1400" i="1">
+                                    <a:solidFill>
+                                      <a:srgbClr val="000000"/>
+                                    </a:solidFill>
+                                    <a:latin typeface="Cambria Math" panose="02040503050406030204" pitchFamily="18" charset="0"/>
+                                  </a:rPr>
+                                  <m:t>𝑖</m:t>
+                                </m:r>
+                              </m:sub>
+                            </m:sSub>
+                            <m:r>
+                              <a:rPr lang="en-US" sz="1400" i="1">
+                                <a:solidFill>
+                                  <a:srgbClr val="000000"/>
+                                </a:solidFill>
+                                <a:latin typeface="Cambria Math" panose="02040503050406030204" pitchFamily="18" charset="0"/>
+                              </a:rPr>
+                              <m:t>,</m:t>
+                            </m:r>
+                            <m:sSub>
+                              <m:sSubPr>
+                                <m:ctrlPr>
+                                  <a:rPr lang="en-US" sz="1400" i="1">
+                                    <a:solidFill>
+                                      <a:srgbClr val="000000"/>
+                                    </a:solidFill>
+                                    <a:latin typeface="Cambria Math" panose="02040503050406030204" pitchFamily="18" charset="0"/>
+                                  </a:rPr>
+                                </m:ctrlPr>
+                              </m:sSubPr>
+                              <m:e>
+                                <m:r>
+                                  <a:rPr lang="en-US" sz="1400" i="1">
+                                    <a:solidFill>
+                                      <a:srgbClr val="000000"/>
+                                    </a:solidFill>
+                                    <a:latin typeface="Cambria Math" panose="02040503050406030204" pitchFamily="18" charset="0"/>
+                                  </a:rPr>
+                                  <m:t>𝑎</m:t>
+                                </m:r>
+                              </m:e>
+                              <m:sub>
+                                <m:r>
+                                  <a:rPr lang="en-US" sz="1400" i="1">
+                                    <a:solidFill>
+                                      <a:srgbClr val="000000"/>
+                                    </a:solidFill>
+                                    <a:latin typeface="Cambria Math" panose="02040503050406030204" pitchFamily="18" charset="0"/>
+                                  </a:rPr>
+                                  <m:t>𝑖</m:t>
+                                </m:r>
+                              </m:sub>
+                            </m:sSub>
+                            <m:r>
+                              <a:rPr lang="en-US" sz="1400" i="1">
+                                <a:solidFill>
+                                  <a:srgbClr val="000000"/>
+                                </a:solidFill>
+                                <a:latin typeface="Cambria Math" panose="02040503050406030204" pitchFamily="18" charset="0"/>
+                              </a:rPr>
+                              <m:t>)</m:t>
+                            </m:r>
+                          </m:e>
+                        </m:d>
                       </m:e>
-                    </m:nary>
+                      <m:sup>
+                        <m:r>
+                          <a:rPr lang="en-US" sz="1400" i="1">
+                            <a:solidFill>
+                              <a:srgbClr val="000000"/>
+                            </a:solidFill>
+                            <a:latin typeface="Cambria Math" panose="02040503050406030204" pitchFamily="18" charset="0"/>
+                          </a:rPr>
+                          <m:t>2</m:t>
+                        </m:r>
+                      </m:sup>
+                    </m:sSup>
                   </m:oMath>
                 </a14:m>
                 <a:r>
@@ -25656,8 +25573,8 @@
           </a:p>
         </p:txBody>
       </p:sp>
-      <mc:AlternateContent xmlns:mc="http://schemas.openxmlformats.org/markup-compatibility/2006">
-        <mc:Choice xmlns:a14="http://schemas.microsoft.com/office/drawing/2010/main" Requires="a14">
+      <mc:AlternateContent xmlns:mc="http://schemas.openxmlformats.org/markup-compatibility/2006" xmlns:a14="http://schemas.microsoft.com/office/drawing/2010/main">
+        <mc:Choice Requires="a14">
           <p:sp>
             <p:nvSpPr>
               <p:cNvPr id="7" name="Google Shape;311;p57">
@@ -27072,7 +26989,7 @@
             </p:txBody>
           </p:sp>
         </mc:Choice>
-        <mc:Fallback>
+        <mc:Fallback xmlns="">
           <p:sp>
             <p:nvSpPr>
               <p:cNvPr id="7" name="Google Shape;311;p57">
@@ -27226,8 +27143,8 @@
           </a:p>
         </p:txBody>
       </p:sp>
-      <mc:AlternateContent xmlns:mc="http://schemas.openxmlformats.org/markup-compatibility/2006">
-        <mc:Choice xmlns:a14="http://schemas.microsoft.com/office/drawing/2010/main" Requires="a14">
+      <mc:AlternateContent xmlns:mc="http://schemas.openxmlformats.org/markup-compatibility/2006" xmlns:a14="http://schemas.microsoft.com/office/drawing/2010/main">
+        <mc:Choice Requires="a14">
           <p:sp>
             <p:nvSpPr>
               <p:cNvPr id="7" name="Google Shape;311;p57">
@@ -28665,7 +28582,7 @@
             </p:txBody>
           </p:sp>
         </mc:Choice>
-        <mc:Fallback>
+        <mc:Fallback xmlns="">
           <p:sp>
             <p:nvSpPr>
               <p:cNvPr id="7" name="Google Shape;311;p57">
@@ -29143,8 +29060,8 @@
           </a:p>
         </p:txBody>
       </p:sp>
-      <mc:AlternateContent xmlns:mc="http://schemas.openxmlformats.org/markup-compatibility/2006">
-        <mc:Choice xmlns:a14="http://schemas.microsoft.com/office/drawing/2010/main" Requires="a14">
+      <mc:AlternateContent xmlns:mc="http://schemas.openxmlformats.org/markup-compatibility/2006" xmlns:a14="http://schemas.microsoft.com/office/drawing/2010/main">
+        <mc:Choice Requires="a14">
           <p:sp>
             <p:nvSpPr>
               <p:cNvPr id="2" name="TextBox 1">
@@ -29173,6 +29090,7 @@
               </a:bodyPr>
               <a:lstStyle/>
               <a:p>
+                <a:pPr/>
                 <a14:m>
                   <m:oMathPara xmlns:m="http://schemas.openxmlformats.org/officeDocument/2006/math">
                     <m:oMathParaPr>
@@ -29880,7 +29798,7 @@
             </p:txBody>
           </p:sp>
         </mc:Choice>
-        <mc:Fallback>
+        <mc:Fallback xmlns="">
           <p:sp>
             <p:nvSpPr>
               <p:cNvPr id="2" name="TextBox 1">
@@ -29925,8 +29843,8 @@
           </p:sp>
         </mc:Fallback>
       </mc:AlternateContent>
-      <mc:AlternateContent xmlns:mc="http://schemas.openxmlformats.org/markup-compatibility/2006">
-        <mc:Choice xmlns:a14="http://schemas.microsoft.com/office/drawing/2010/main" Requires="a14">
+      <mc:AlternateContent xmlns:mc="http://schemas.openxmlformats.org/markup-compatibility/2006" xmlns:a14="http://schemas.microsoft.com/office/drawing/2010/main">
+        <mc:Choice Requires="a14">
           <p:sp>
             <p:nvSpPr>
               <p:cNvPr id="6" name="TextBox 5">
@@ -30788,7 +30706,7 @@
             </p:txBody>
           </p:sp>
         </mc:Choice>
-        <mc:Fallback>
+        <mc:Fallback xmlns="">
           <p:sp>
             <p:nvSpPr>
               <p:cNvPr id="6" name="TextBox 5">

</xml_diff>

<commit_message>
DQN algorithm - changes after lesson
</commit_message>
<xml_diff>
--- a/RL/02 - Deep Reinforcement Learning/02 - 02 Deep Q-Network (DQN) алгоритм/Deep Q network (DQN).pptx
+++ b/RL/02 - Deep Reinforcement Learning/02 - 02 Deep Q-Network (DQN) алгоритм/Deep Q network (DQN).pptx
@@ -6,7 +6,7 @@
     <p:sldMasterId id="2147483692" r:id="rId2"/>
   </p:sldMasterIdLst>
   <p:notesMasterIdLst>
-    <p:notesMasterId r:id="rId34"/>
+    <p:notesMasterId r:id="rId35"/>
   </p:notesMasterIdLst>
   <p:sldIdLst>
     <p:sldId id="256" r:id="rId3"/>
@@ -23,44 +23,45 @@
     <p:sldId id="338" r:id="rId14"/>
     <p:sldId id="333" r:id="rId15"/>
     <p:sldId id="343" r:id="rId16"/>
-    <p:sldId id="344" r:id="rId17"/>
-    <p:sldId id="339" r:id="rId18"/>
-    <p:sldId id="340" r:id="rId19"/>
-    <p:sldId id="335" r:id="rId20"/>
-    <p:sldId id="341" r:id="rId21"/>
-    <p:sldId id="342" r:id="rId22"/>
-    <p:sldId id="346" r:id="rId23"/>
-    <p:sldId id="278" r:id="rId24"/>
-    <p:sldId id="279" r:id="rId25"/>
-    <p:sldId id="280" r:id="rId26"/>
-    <p:sldId id="281" r:id="rId27"/>
-    <p:sldId id="282" r:id="rId28"/>
-    <p:sldId id="283" r:id="rId29"/>
-    <p:sldId id="345" r:id="rId30"/>
-    <p:sldId id="287" r:id="rId31"/>
-    <p:sldId id="289" r:id="rId32"/>
-    <p:sldId id="337" r:id="rId33"/>
+    <p:sldId id="348" r:id="rId17"/>
+    <p:sldId id="344" r:id="rId18"/>
+    <p:sldId id="339" r:id="rId19"/>
+    <p:sldId id="340" r:id="rId20"/>
+    <p:sldId id="335" r:id="rId21"/>
+    <p:sldId id="341" r:id="rId22"/>
+    <p:sldId id="342" r:id="rId23"/>
+    <p:sldId id="346" r:id="rId24"/>
+    <p:sldId id="278" r:id="rId25"/>
+    <p:sldId id="279" r:id="rId26"/>
+    <p:sldId id="280" r:id="rId27"/>
+    <p:sldId id="281" r:id="rId28"/>
+    <p:sldId id="282" r:id="rId29"/>
+    <p:sldId id="283" r:id="rId30"/>
+    <p:sldId id="345" r:id="rId31"/>
+    <p:sldId id="287" r:id="rId32"/>
+    <p:sldId id="289" r:id="rId33"/>
+    <p:sldId id="337" r:id="rId34"/>
   </p:sldIdLst>
   <p:sldSz cx="9144000" cy="5143500" type="screen16x9"/>
   <p:notesSz cx="6858000" cy="9144000"/>
   <p:embeddedFontLst>
     <p:embeddedFont>
       <p:font typeface="Cambria Math" panose="02040503050406030204" pitchFamily="18" charset="0"/>
-      <p:regular r:id="rId35"/>
+      <p:regular r:id="rId36"/>
     </p:embeddedFont>
     <p:embeddedFont>
       <p:font typeface="Helvetica Neue" panose="02000503000000020004" pitchFamily="2" charset="0"/>
-      <p:regular r:id="rId36"/>
-      <p:bold r:id="rId37"/>
-      <p:italic r:id="rId38"/>
-      <p:boldItalic r:id="rId39"/>
+      <p:regular r:id="rId37"/>
+      <p:bold r:id="rId38"/>
+      <p:italic r:id="rId39"/>
+      <p:boldItalic r:id="rId40"/>
     </p:embeddedFont>
     <p:embeddedFont>
       <p:font typeface="Roboto" panose="02000000000000000000" pitchFamily="2" charset="0"/>
-      <p:regular r:id="rId40"/>
-      <p:bold r:id="rId41"/>
-      <p:italic r:id="rId42"/>
-      <p:boldItalic r:id="rId43"/>
+      <p:regular r:id="rId41"/>
+      <p:bold r:id="rId42"/>
+      <p:italic r:id="rId43"/>
+      <p:boldItalic r:id="rId44"/>
     </p:embeddedFont>
   </p:embeddedFontLst>
   <p:defaultTextStyle>
@@ -1406,6 +1407,115 @@
   <p:cSld>
     <p:spTree>
       <p:nvGrpSpPr>
+        <p:cNvPr id="1" name="Shape 306"/>
+        <p:cNvGrpSpPr/>
+        <p:nvPr/>
+      </p:nvGrpSpPr>
+      <p:grpSpPr>
+        <a:xfrm>
+          <a:off x="0" y="0"/>
+          <a:ext cx="0" cy="0"/>
+          <a:chOff x="0" y="0"/>
+          <a:chExt cx="0" cy="0"/>
+        </a:xfrm>
+      </p:grpSpPr>
+      <p:sp>
+        <p:nvSpPr>
+          <p:cNvPr id="307" name="Google Shape;307;gdf29b9fb24_0_69:notes"/>
+          <p:cNvSpPr>
+            <a:spLocks noGrp="1" noRot="1" noChangeAspect="1"/>
+          </p:cNvSpPr>
+          <p:nvPr>
+            <p:ph type="sldImg" idx="2"/>
+          </p:nvPr>
+        </p:nvSpPr>
+        <p:spPr>
+          <a:xfrm>
+            <a:off x="381000" y="685800"/>
+            <a:ext cx="6096000" cy="3429000"/>
+          </a:xfrm>
+          <a:custGeom>
+            <a:avLst/>
+            <a:gdLst/>
+            <a:ahLst/>
+            <a:cxnLst/>
+            <a:rect l="l" t="t" r="r" b="b"/>
+            <a:pathLst>
+              <a:path w="120000" h="120000" extrusionOk="0">
+                <a:moveTo>
+                  <a:pt x="0" y="0"/>
+                </a:moveTo>
+                <a:lnTo>
+                  <a:pt x="120000" y="0"/>
+                </a:lnTo>
+                <a:lnTo>
+                  <a:pt x="120000" y="120000"/>
+                </a:lnTo>
+                <a:lnTo>
+                  <a:pt x="0" y="120000"/>
+                </a:lnTo>
+                <a:close/>
+              </a:path>
+            </a:pathLst>
+          </a:custGeom>
+        </p:spPr>
+      </p:sp>
+      <p:sp>
+        <p:nvSpPr>
+          <p:cNvPr id="308" name="Google Shape;308;gdf29b9fb24_0_69:notes"/>
+          <p:cNvSpPr txBox="1">
+            <a:spLocks noGrp="1"/>
+          </p:cNvSpPr>
+          <p:nvPr>
+            <p:ph type="body" idx="1"/>
+          </p:nvPr>
+        </p:nvSpPr>
+        <p:spPr>
+          <a:xfrm>
+            <a:off x="685800" y="4343400"/>
+            <a:ext cx="5486400" cy="4114800"/>
+          </a:xfrm>
+          <a:prstGeom prst="rect">
+            <a:avLst/>
+          </a:prstGeom>
+        </p:spPr>
+        <p:txBody>
+          <a:bodyPr spcFirstLastPara="1" wrap="square" lIns="91425" tIns="91425" rIns="91425" bIns="91425" anchor="t" anchorCtr="0">
+            <a:noAutofit/>
+          </a:bodyPr>
+          <a:lstStyle/>
+          <a:p>
+            <a:pPr marL="0" lvl="0" indent="0" algn="l" rtl="0">
+              <a:spcBef>
+                <a:spcPts val="0"/>
+              </a:spcBef>
+              <a:spcAft>
+                <a:spcPts val="0"/>
+              </a:spcAft>
+              <a:buNone/>
+            </a:pPr>
+            <a:endParaRPr/>
+          </a:p>
+        </p:txBody>
+      </p:sp>
+    </p:spTree>
+    <p:extLst>
+      <p:ext uri="{BB962C8B-B14F-4D97-AF65-F5344CB8AC3E}">
+        <p14:creationId xmlns:p14="http://schemas.microsoft.com/office/powerpoint/2010/main" val="597053092"/>
+      </p:ext>
+    </p:extLst>
+  </p:cSld>
+  <p:clrMapOvr>
+    <a:masterClrMapping/>
+  </p:clrMapOvr>
+</p:notes>
+</file>
+
+<file path=ppt/notesSlides/notesSlide16.xml><?xml version="1.0" encoding="utf-8"?>
+<p:notes xmlns:a="http://schemas.openxmlformats.org/drawingml/2006/main" xmlns:r="http://schemas.openxmlformats.org/officeDocument/2006/relationships" xmlns:p="http://schemas.openxmlformats.org/presentationml/2006/main" showMasterSp="0" showMasterPhAnim="0">
+  <p:cSld>
+    <p:spTree>
+      <p:nvGrpSpPr>
         <p:cNvPr id="1" name="Shape 301"/>
         <p:cNvGrpSpPr/>
         <p:nvPr/>
@@ -1501,115 +1611,6 @@
     <p:extLst>
       <p:ext uri="{BB962C8B-B14F-4D97-AF65-F5344CB8AC3E}">
         <p14:creationId xmlns:p14="http://schemas.microsoft.com/office/powerpoint/2010/main" val="3038743527"/>
-      </p:ext>
-    </p:extLst>
-  </p:cSld>
-  <p:clrMapOvr>
-    <a:masterClrMapping/>
-  </p:clrMapOvr>
-</p:notes>
-</file>
-
-<file path=ppt/notesSlides/notesSlide16.xml><?xml version="1.0" encoding="utf-8"?>
-<p:notes xmlns:a="http://schemas.openxmlformats.org/drawingml/2006/main" xmlns:r="http://schemas.openxmlformats.org/officeDocument/2006/relationships" xmlns:p="http://schemas.openxmlformats.org/presentationml/2006/main" showMasterSp="0" showMasterPhAnim="0">
-  <p:cSld>
-    <p:spTree>
-      <p:nvGrpSpPr>
-        <p:cNvPr id="1" name="Shape 306"/>
-        <p:cNvGrpSpPr/>
-        <p:nvPr/>
-      </p:nvGrpSpPr>
-      <p:grpSpPr>
-        <a:xfrm>
-          <a:off x="0" y="0"/>
-          <a:ext cx="0" cy="0"/>
-          <a:chOff x="0" y="0"/>
-          <a:chExt cx="0" cy="0"/>
-        </a:xfrm>
-      </p:grpSpPr>
-      <p:sp>
-        <p:nvSpPr>
-          <p:cNvPr id="307" name="Google Shape;307;gdf29b9fb24_0_69:notes"/>
-          <p:cNvSpPr>
-            <a:spLocks noGrp="1" noRot="1" noChangeAspect="1"/>
-          </p:cNvSpPr>
-          <p:nvPr>
-            <p:ph type="sldImg" idx="2"/>
-          </p:nvPr>
-        </p:nvSpPr>
-        <p:spPr>
-          <a:xfrm>
-            <a:off x="381000" y="685800"/>
-            <a:ext cx="6096000" cy="3429000"/>
-          </a:xfrm>
-          <a:custGeom>
-            <a:avLst/>
-            <a:gdLst/>
-            <a:ahLst/>
-            <a:cxnLst/>
-            <a:rect l="l" t="t" r="r" b="b"/>
-            <a:pathLst>
-              <a:path w="120000" h="120000" extrusionOk="0">
-                <a:moveTo>
-                  <a:pt x="0" y="0"/>
-                </a:moveTo>
-                <a:lnTo>
-                  <a:pt x="120000" y="0"/>
-                </a:lnTo>
-                <a:lnTo>
-                  <a:pt x="120000" y="120000"/>
-                </a:lnTo>
-                <a:lnTo>
-                  <a:pt x="0" y="120000"/>
-                </a:lnTo>
-                <a:close/>
-              </a:path>
-            </a:pathLst>
-          </a:custGeom>
-        </p:spPr>
-      </p:sp>
-      <p:sp>
-        <p:nvSpPr>
-          <p:cNvPr id="308" name="Google Shape;308;gdf29b9fb24_0_69:notes"/>
-          <p:cNvSpPr txBox="1">
-            <a:spLocks noGrp="1"/>
-          </p:cNvSpPr>
-          <p:nvPr>
-            <p:ph type="body" idx="1"/>
-          </p:nvPr>
-        </p:nvSpPr>
-        <p:spPr>
-          <a:xfrm>
-            <a:off x="685800" y="4343400"/>
-            <a:ext cx="5486400" cy="4114800"/>
-          </a:xfrm>
-          <a:prstGeom prst="rect">
-            <a:avLst/>
-          </a:prstGeom>
-        </p:spPr>
-        <p:txBody>
-          <a:bodyPr spcFirstLastPara="1" wrap="square" lIns="91425" tIns="91425" rIns="91425" bIns="91425" anchor="t" anchorCtr="0">
-            <a:noAutofit/>
-          </a:bodyPr>
-          <a:lstStyle/>
-          <a:p>
-            <a:pPr marL="0" lvl="0" indent="0" algn="l" rtl="0">
-              <a:spcBef>
-                <a:spcPts val="0"/>
-              </a:spcBef>
-              <a:spcAft>
-                <a:spcPts val="0"/>
-              </a:spcAft>
-              <a:buNone/>
-            </a:pPr>
-            <a:endParaRPr/>
-          </a:p>
-        </p:txBody>
-      </p:sp>
-    </p:spTree>
-    <p:extLst>
-      <p:ext uri="{BB962C8B-B14F-4D97-AF65-F5344CB8AC3E}">
-        <p14:creationId xmlns:p14="http://schemas.microsoft.com/office/powerpoint/2010/main" val="443033198"/>
       </p:ext>
     </p:extLst>
   </p:cSld>
@@ -1718,7 +1719,7 @@
     </p:spTree>
     <p:extLst>
       <p:ext uri="{BB962C8B-B14F-4D97-AF65-F5344CB8AC3E}">
-        <p14:creationId xmlns:p14="http://schemas.microsoft.com/office/powerpoint/2010/main" val="1874319390"/>
+        <p14:creationId xmlns:p14="http://schemas.microsoft.com/office/powerpoint/2010/main" val="443033198"/>
       </p:ext>
     </p:extLst>
   </p:cSld>
@@ -1827,7 +1828,7 @@
     </p:spTree>
     <p:extLst>
       <p:ext uri="{BB962C8B-B14F-4D97-AF65-F5344CB8AC3E}">
-        <p14:creationId xmlns:p14="http://schemas.microsoft.com/office/powerpoint/2010/main" val="481488466"/>
+        <p14:creationId xmlns:p14="http://schemas.microsoft.com/office/powerpoint/2010/main" val="1874319390"/>
       </p:ext>
     </p:extLst>
   </p:cSld>
@@ -1936,7 +1937,7 @@
     </p:spTree>
     <p:extLst>
       <p:ext uri="{BB962C8B-B14F-4D97-AF65-F5344CB8AC3E}">
-        <p14:creationId xmlns:p14="http://schemas.microsoft.com/office/powerpoint/2010/main" val="1731226352"/>
+        <p14:creationId xmlns:p14="http://schemas.microsoft.com/office/powerpoint/2010/main" val="481488466"/>
       </p:ext>
     </p:extLst>
   </p:cSld>
@@ -2149,7 +2150,7 @@
     </p:spTree>
     <p:extLst>
       <p:ext uri="{BB962C8B-B14F-4D97-AF65-F5344CB8AC3E}">
-        <p14:creationId xmlns:p14="http://schemas.microsoft.com/office/powerpoint/2010/main" val="2468530542"/>
+        <p14:creationId xmlns:p14="http://schemas.microsoft.com/office/powerpoint/2010/main" val="1731226352"/>
       </p:ext>
     </p:extLst>
   </p:cSld>
@@ -2258,6 +2259,115 @@
     </p:spTree>
     <p:extLst>
       <p:ext uri="{BB962C8B-B14F-4D97-AF65-F5344CB8AC3E}">
+        <p14:creationId xmlns:p14="http://schemas.microsoft.com/office/powerpoint/2010/main" val="2468530542"/>
+      </p:ext>
+    </p:extLst>
+  </p:cSld>
+  <p:clrMapOvr>
+    <a:masterClrMapping/>
+  </p:clrMapOvr>
+</p:notes>
+</file>
+
+<file path=ppt/notesSlides/notesSlide22.xml><?xml version="1.0" encoding="utf-8"?>
+<p:notes xmlns:a="http://schemas.openxmlformats.org/drawingml/2006/main" xmlns:r="http://schemas.openxmlformats.org/officeDocument/2006/relationships" xmlns:p="http://schemas.openxmlformats.org/presentationml/2006/main" showMasterSp="0" showMasterPhAnim="0">
+  <p:cSld>
+    <p:spTree>
+      <p:nvGrpSpPr>
+        <p:cNvPr id="1" name="Shape 306"/>
+        <p:cNvGrpSpPr/>
+        <p:nvPr/>
+      </p:nvGrpSpPr>
+      <p:grpSpPr>
+        <a:xfrm>
+          <a:off x="0" y="0"/>
+          <a:ext cx="0" cy="0"/>
+          <a:chOff x="0" y="0"/>
+          <a:chExt cx="0" cy="0"/>
+        </a:xfrm>
+      </p:grpSpPr>
+      <p:sp>
+        <p:nvSpPr>
+          <p:cNvPr id="307" name="Google Shape;307;gdf29b9fb24_0_69:notes"/>
+          <p:cNvSpPr>
+            <a:spLocks noGrp="1" noRot="1" noChangeAspect="1"/>
+          </p:cNvSpPr>
+          <p:nvPr>
+            <p:ph type="sldImg" idx="2"/>
+          </p:nvPr>
+        </p:nvSpPr>
+        <p:spPr>
+          <a:xfrm>
+            <a:off x="381000" y="685800"/>
+            <a:ext cx="6096000" cy="3429000"/>
+          </a:xfrm>
+          <a:custGeom>
+            <a:avLst/>
+            <a:gdLst/>
+            <a:ahLst/>
+            <a:cxnLst/>
+            <a:rect l="l" t="t" r="r" b="b"/>
+            <a:pathLst>
+              <a:path w="120000" h="120000" extrusionOk="0">
+                <a:moveTo>
+                  <a:pt x="0" y="0"/>
+                </a:moveTo>
+                <a:lnTo>
+                  <a:pt x="120000" y="0"/>
+                </a:lnTo>
+                <a:lnTo>
+                  <a:pt x="120000" y="120000"/>
+                </a:lnTo>
+                <a:lnTo>
+                  <a:pt x="0" y="120000"/>
+                </a:lnTo>
+                <a:close/>
+              </a:path>
+            </a:pathLst>
+          </a:custGeom>
+        </p:spPr>
+      </p:sp>
+      <p:sp>
+        <p:nvSpPr>
+          <p:cNvPr id="308" name="Google Shape;308;gdf29b9fb24_0_69:notes"/>
+          <p:cNvSpPr txBox="1">
+            <a:spLocks noGrp="1"/>
+          </p:cNvSpPr>
+          <p:nvPr>
+            <p:ph type="body" idx="1"/>
+          </p:nvPr>
+        </p:nvSpPr>
+        <p:spPr>
+          <a:xfrm>
+            <a:off x="685800" y="4343400"/>
+            <a:ext cx="5486400" cy="4114800"/>
+          </a:xfrm>
+          <a:prstGeom prst="rect">
+            <a:avLst/>
+          </a:prstGeom>
+        </p:spPr>
+        <p:txBody>
+          <a:bodyPr spcFirstLastPara="1" wrap="square" lIns="91425" tIns="91425" rIns="91425" bIns="91425" anchor="t" anchorCtr="0">
+            <a:noAutofit/>
+          </a:bodyPr>
+          <a:lstStyle/>
+          <a:p>
+            <a:pPr marL="0" lvl="0" indent="0" algn="l" rtl="0">
+              <a:spcBef>
+                <a:spcPts val="0"/>
+              </a:spcBef>
+              <a:spcAft>
+                <a:spcPts val="0"/>
+              </a:spcAft>
+              <a:buNone/>
+            </a:pPr>
+            <a:endParaRPr/>
+          </a:p>
+        </p:txBody>
+      </p:sp>
+    </p:spTree>
+    <p:extLst>
+      <p:ext uri="{BB962C8B-B14F-4D97-AF65-F5344CB8AC3E}">
         <p14:creationId xmlns:p14="http://schemas.microsoft.com/office/powerpoint/2010/main" val="984976598"/>
       </p:ext>
     </p:extLst>
@@ -2268,7 +2378,7 @@
 </p:notes>
 </file>
 
-<file path=ppt/notesSlides/notesSlide22.xml><?xml version="1.0" encoding="utf-8"?>
+<file path=ppt/notesSlides/notesSlide23.xml><?xml version="1.0" encoding="utf-8"?>
 <p:notes xmlns:a="http://schemas.openxmlformats.org/drawingml/2006/main" xmlns:r="http://schemas.openxmlformats.org/officeDocument/2006/relationships" xmlns:p="http://schemas.openxmlformats.org/presentationml/2006/main" showMasterSp="0" showMasterPhAnim="0">
   <p:cSld>
     <p:spTree>
@@ -2372,7 +2482,7 @@
 </p:notes>
 </file>
 
-<file path=ppt/notesSlides/notesSlide23.xml><?xml version="1.0" encoding="utf-8"?>
+<file path=ppt/notesSlides/notesSlide24.xml><?xml version="1.0" encoding="utf-8"?>
 <p:notes xmlns:a="http://schemas.openxmlformats.org/drawingml/2006/main" xmlns:r="http://schemas.openxmlformats.org/officeDocument/2006/relationships" xmlns:p="http://schemas.openxmlformats.org/presentationml/2006/main" showMasterSp="0" showMasterPhAnim="0">
   <p:cSld>
     <p:spTree>
@@ -2476,7 +2586,7 @@
 </p:notes>
 </file>
 
-<file path=ppt/notesSlides/notesSlide24.xml><?xml version="1.0" encoding="utf-8"?>
+<file path=ppt/notesSlides/notesSlide25.xml><?xml version="1.0" encoding="utf-8"?>
 <p:notes xmlns:a="http://schemas.openxmlformats.org/drawingml/2006/main" xmlns:r="http://schemas.openxmlformats.org/officeDocument/2006/relationships" xmlns:p="http://schemas.openxmlformats.org/presentationml/2006/main" showMasterSp="0" showMasterPhAnim="0">
   <p:cSld>
     <p:spTree>
@@ -2580,7 +2690,7 @@
 </p:notes>
 </file>
 
-<file path=ppt/notesSlides/notesSlide25.xml><?xml version="1.0" encoding="utf-8"?>
+<file path=ppt/notesSlides/notesSlide26.xml><?xml version="1.0" encoding="utf-8"?>
 <p:notes xmlns:a="http://schemas.openxmlformats.org/drawingml/2006/main" xmlns:r="http://schemas.openxmlformats.org/officeDocument/2006/relationships" xmlns:p="http://schemas.openxmlformats.org/presentationml/2006/main" showMasterSp="0" showMasterPhAnim="0">
   <p:cSld>
     <p:spTree>
@@ -2684,7 +2794,7 @@
 </p:notes>
 </file>
 
-<file path=ppt/notesSlides/notesSlide26.xml><?xml version="1.0" encoding="utf-8"?>
+<file path=ppt/notesSlides/notesSlide27.xml><?xml version="1.0" encoding="utf-8"?>
 <p:notes xmlns:a="http://schemas.openxmlformats.org/drawingml/2006/main" xmlns:r="http://schemas.openxmlformats.org/officeDocument/2006/relationships" xmlns:p="http://schemas.openxmlformats.org/presentationml/2006/main" showMasterSp="0" showMasterPhAnim="0">
   <p:cSld>
     <p:spTree>
@@ -2788,7 +2898,7 @@
 </p:notes>
 </file>
 
-<file path=ppt/notesSlides/notesSlide27.xml><?xml version="1.0" encoding="utf-8"?>
+<file path=ppt/notesSlides/notesSlide28.xml><?xml version="1.0" encoding="utf-8"?>
 <p:notes xmlns:a="http://schemas.openxmlformats.org/drawingml/2006/main" xmlns:r="http://schemas.openxmlformats.org/officeDocument/2006/relationships" xmlns:p="http://schemas.openxmlformats.org/presentationml/2006/main" showMasterSp="0" showMasterPhAnim="0">
   <p:cSld>
     <p:spTree>
@@ -2892,7 +3002,7 @@
 </p:notes>
 </file>
 
-<file path=ppt/notesSlides/notesSlide28.xml><?xml version="1.0" encoding="utf-8"?>
+<file path=ppt/notesSlides/notesSlide29.xml><?xml version="1.0" encoding="utf-8"?>
 <p:notes xmlns:a="http://schemas.openxmlformats.org/drawingml/2006/main" xmlns:r="http://schemas.openxmlformats.org/officeDocument/2006/relationships" xmlns:p="http://schemas.openxmlformats.org/presentationml/2006/main" showMasterSp="0" showMasterPhAnim="0">
   <p:cSld>
     <p:spTree>
@@ -2994,110 +3104,6 @@
         <p14:creationId xmlns:p14="http://schemas.microsoft.com/office/powerpoint/2010/main" val="378758117"/>
       </p:ext>
     </p:extLst>
-  </p:cSld>
-  <p:clrMapOvr>
-    <a:masterClrMapping/>
-  </p:clrMapOvr>
-</p:notes>
-</file>
-
-<file path=ppt/notesSlides/notesSlide29.xml><?xml version="1.0" encoding="utf-8"?>
-<p:notes xmlns:a="http://schemas.openxmlformats.org/drawingml/2006/main" xmlns:r="http://schemas.openxmlformats.org/officeDocument/2006/relationships" xmlns:p="http://schemas.openxmlformats.org/presentationml/2006/main" showMasterSp="0" showMasterPhAnim="0">
-  <p:cSld>
-    <p:spTree>
-      <p:nvGrpSpPr>
-        <p:cNvPr id="1" name="Shape 446"/>
-        <p:cNvGrpSpPr/>
-        <p:nvPr/>
-      </p:nvGrpSpPr>
-      <p:grpSpPr>
-        <a:xfrm>
-          <a:off x="0" y="0"/>
-          <a:ext cx="0" cy="0"/>
-          <a:chOff x="0" y="0"/>
-          <a:chExt cx="0" cy="0"/>
-        </a:xfrm>
-      </p:grpSpPr>
-      <p:sp>
-        <p:nvSpPr>
-          <p:cNvPr id="447" name="Google Shape;447;gdf6222e6af_0_50:notes"/>
-          <p:cNvSpPr>
-            <a:spLocks noGrp="1" noRot="1" noChangeAspect="1"/>
-          </p:cNvSpPr>
-          <p:nvPr>
-            <p:ph type="sldImg" idx="2"/>
-          </p:nvPr>
-        </p:nvSpPr>
-        <p:spPr>
-          <a:xfrm>
-            <a:off x="381000" y="685800"/>
-            <a:ext cx="6096000" cy="3429000"/>
-          </a:xfrm>
-          <a:custGeom>
-            <a:avLst/>
-            <a:gdLst/>
-            <a:ahLst/>
-            <a:cxnLst/>
-            <a:rect l="l" t="t" r="r" b="b"/>
-            <a:pathLst>
-              <a:path w="120000" h="120000" extrusionOk="0">
-                <a:moveTo>
-                  <a:pt x="0" y="0"/>
-                </a:moveTo>
-                <a:lnTo>
-                  <a:pt x="120000" y="0"/>
-                </a:lnTo>
-                <a:lnTo>
-                  <a:pt x="120000" y="120000"/>
-                </a:lnTo>
-                <a:lnTo>
-                  <a:pt x="0" y="120000"/>
-                </a:lnTo>
-                <a:close/>
-              </a:path>
-            </a:pathLst>
-          </a:custGeom>
-        </p:spPr>
-      </p:sp>
-      <p:sp>
-        <p:nvSpPr>
-          <p:cNvPr id="448" name="Google Shape;448;gdf6222e6af_0_50:notes"/>
-          <p:cNvSpPr txBox="1">
-            <a:spLocks noGrp="1"/>
-          </p:cNvSpPr>
-          <p:nvPr>
-            <p:ph type="body" idx="1"/>
-          </p:nvPr>
-        </p:nvSpPr>
-        <p:spPr>
-          <a:xfrm>
-            <a:off x="685800" y="4343400"/>
-            <a:ext cx="5486400" cy="4114800"/>
-          </a:xfrm>
-          <a:prstGeom prst="rect">
-            <a:avLst/>
-          </a:prstGeom>
-        </p:spPr>
-        <p:txBody>
-          <a:bodyPr spcFirstLastPara="1" wrap="square" lIns="91425" tIns="91425" rIns="91425" bIns="91425" anchor="t" anchorCtr="0">
-            <a:noAutofit/>
-          </a:bodyPr>
-          <a:lstStyle/>
-          <a:p>
-            <a:pPr marL="0" lvl="0" indent="0" algn="l" rtl="0">
-              <a:spcBef>
-                <a:spcPts val="0"/>
-              </a:spcBef>
-              <a:spcAft>
-                <a:spcPts val="0"/>
-              </a:spcAft>
-              <a:buNone/>
-            </a:pPr>
-            <a:endParaRPr/>
-          </a:p>
-        </p:txBody>
-      </p:sp>
-    </p:spTree>
   </p:cSld>
   <p:clrMapOvr>
     <a:masterClrMapping/>
@@ -3214,6 +3220,110 @@
   <p:cSld>
     <p:spTree>
       <p:nvGrpSpPr>
+        <p:cNvPr id="1" name="Shape 446"/>
+        <p:cNvGrpSpPr/>
+        <p:nvPr/>
+      </p:nvGrpSpPr>
+      <p:grpSpPr>
+        <a:xfrm>
+          <a:off x="0" y="0"/>
+          <a:ext cx="0" cy="0"/>
+          <a:chOff x="0" y="0"/>
+          <a:chExt cx="0" cy="0"/>
+        </a:xfrm>
+      </p:grpSpPr>
+      <p:sp>
+        <p:nvSpPr>
+          <p:cNvPr id="447" name="Google Shape;447;gdf6222e6af_0_50:notes"/>
+          <p:cNvSpPr>
+            <a:spLocks noGrp="1" noRot="1" noChangeAspect="1"/>
+          </p:cNvSpPr>
+          <p:nvPr>
+            <p:ph type="sldImg" idx="2"/>
+          </p:nvPr>
+        </p:nvSpPr>
+        <p:spPr>
+          <a:xfrm>
+            <a:off x="381000" y="685800"/>
+            <a:ext cx="6096000" cy="3429000"/>
+          </a:xfrm>
+          <a:custGeom>
+            <a:avLst/>
+            <a:gdLst/>
+            <a:ahLst/>
+            <a:cxnLst/>
+            <a:rect l="l" t="t" r="r" b="b"/>
+            <a:pathLst>
+              <a:path w="120000" h="120000" extrusionOk="0">
+                <a:moveTo>
+                  <a:pt x="0" y="0"/>
+                </a:moveTo>
+                <a:lnTo>
+                  <a:pt x="120000" y="0"/>
+                </a:lnTo>
+                <a:lnTo>
+                  <a:pt x="120000" y="120000"/>
+                </a:lnTo>
+                <a:lnTo>
+                  <a:pt x="0" y="120000"/>
+                </a:lnTo>
+                <a:close/>
+              </a:path>
+            </a:pathLst>
+          </a:custGeom>
+        </p:spPr>
+      </p:sp>
+      <p:sp>
+        <p:nvSpPr>
+          <p:cNvPr id="448" name="Google Shape;448;gdf6222e6af_0_50:notes"/>
+          <p:cNvSpPr txBox="1">
+            <a:spLocks noGrp="1"/>
+          </p:cNvSpPr>
+          <p:nvPr>
+            <p:ph type="body" idx="1"/>
+          </p:nvPr>
+        </p:nvSpPr>
+        <p:spPr>
+          <a:xfrm>
+            <a:off x="685800" y="4343400"/>
+            <a:ext cx="5486400" cy="4114800"/>
+          </a:xfrm>
+          <a:prstGeom prst="rect">
+            <a:avLst/>
+          </a:prstGeom>
+        </p:spPr>
+        <p:txBody>
+          <a:bodyPr spcFirstLastPara="1" wrap="square" lIns="91425" tIns="91425" rIns="91425" bIns="91425" anchor="t" anchorCtr="0">
+            <a:noAutofit/>
+          </a:bodyPr>
+          <a:lstStyle/>
+          <a:p>
+            <a:pPr marL="0" lvl="0" indent="0" algn="l" rtl="0">
+              <a:spcBef>
+                <a:spcPts val="0"/>
+              </a:spcBef>
+              <a:spcAft>
+                <a:spcPts val="0"/>
+              </a:spcAft>
+              <a:buNone/>
+            </a:pPr>
+            <a:endParaRPr/>
+          </a:p>
+        </p:txBody>
+      </p:sp>
+    </p:spTree>
+  </p:cSld>
+  <p:clrMapOvr>
+    <a:masterClrMapping/>
+  </p:clrMapOvr>
+</p:notes>
+</file>
+
+<file path=ppt/notesSlides/notesSlide31.xml><?xml version="1.0" encoding="utf-8"?>
+<p:notes xmlns:a="http://schemas.openxmlformats.org/drawingml/2006/main" xmlns:r="http://schemas.openxmlformats.org/officeDocument/2006/relationships" xmlns:p="http://schemas.openxmlformats.org/presentationml/2006/main" showMasterSp="0" showMasterPhAnim="0">
+  <p:cSld>
+    <p:spTree>
+      <p:nvGrpSpPr>
         <p:cNvPr id="1" name="Shape 471"/>
         <p:cNvGrpSpPr/>
         <p:nvPr/>
@@ -3313,7 +3423,7 @@
 </p:notes>
 </file>
 
-<file path=ppt/notesSlides/notesSlide31.xml><?xml version="1.0" encoding="utf-8"?>
+<file path=ppt/notesSlides/notesSlide32.xml><?xml version="1.0" encoding="utf-8"?>
 <p:notes xmlns:a="http://schemas.openxmlformats.org/drawingml/2006/main" xmlns:r="http://schemas.openxmlformats.org/officeDocument/2006/relationships" xmlns:p="http://schemas.openxmlformats.org/presentationml/2006/main" showMasterSp="0" showMasterPhAnim="0">
   <p:cSld>
     <p:spTree>
@@ -23135,6 +23245,104 @@
   <p:cSld>
     <p:spTree>
       <p:nvGrpSpPr>
+        <p:cNvPr id="1" name="Shape 309"/>
+        <p:cNvGrpSpPr/>
+        <p:nvPr/>
+      </p:nvGrpSpPr>
+      <p:grpSpPr>
+        <a:xfrm>
+          <a:off x="0" y="0"/>
+          <a:ext cx="0" cy="0"/>
+          <a:chOff x="0" y="0"/>
+          <a:chExt cx="0" cy="0"/>
+        </a:xfrm>
+      </p:grpSpPr>
+      <p:sp>
+        <p:nvSpPr>
+          <p:cNvPr id="310" name="Google Shape;310;p57"/>
+          <p:cNvSpPr txBox="1">
+            <a:spLocks noGrp="1"/>
+          </p:cNvSpPr>
+          <p:nvPr>
+            <p:ph type="title"/>
+          </p:nvPr>
+        </p:nvSpPr>
+        <p:spPr>
+          <a:xfrm>
+            <a:off x="500550" y="330724"/>
+            <a:ext cx="8520600" cy="1095900"/>
+          </a:xfrm>
+          <a:prstGeom prst="rect">
+            <a:avLst/>
+          </a:prstGeom>
+        </p:spPr>
+        <p:txBody>
+          <a:bodyPr spcFirstLastPara="1" wrap="square" lIns="91425" tIns="91425" rIns="91425" bIns="91425" anchor="t" anchorCtr="0">
+            <a:noAutofit/>
+          </a:bodyPr>
+          <a:lstStyle/>
+          <a:p>
+            <a:r>
+              <a:rPr lang="en-US" dirty="0">
+                <a:solidFill>
+                  <a:srgbClr val="000000"/>
+                </a:solidFill>
+                <a:latin typeface="Helvetica Neue" panose="02000503000000020004" pitchFamily="2" charset="0"/>
+              </a:rPr>
+              <a:t>Algorithms</a:t>
+            </a:r>
+            <a:endParaRPr dirty="0"/>
+          </a:p>
+        </p:txBody>
+      </p:sp>
+      <p:pic>
+        <p:nvPicPr>
+          <p:cNvPr id="3" name="Picture 2">
+            <a:extLst>
+              <a:ext uri="{FF2B5EF4-FFF2-40B4-BE49-F238E27FC236}">
+                <a16:creationId xmlns:a16="http://schemas.microsoft.com/office/drawing/2014/main" id="{817AC6D5-07DF-4C46-8ABA-991007203CE7}"/>
+              </a:ext>
+            </a:extLst>
+          </p:cNvPr>
+          <p:cNvPicPr>
+            <a:picLocks noChangeAspect="1"/>
+          </p:cNvPicPr>
+          <p:nvPr/>
+        </p:nvPicPr>
+        <p:blipFill>
+          <a:blip r:embed="rId3"/>
+          <a:stretch>
+            <a:fillRect/>
+          </a:stretch>
+        </p:blipFill>
+        <p:spPr>
+          <a:xfrm>
+            <a:off x="1100181" y="1068918"/>
+            <a:ext cx="7321337" cy="3675024"/>
+          </a:xfrm>
+          <a:prstGeom prst="rect">
+            <a:avLst/>
+          </a:prstGeom>
+        </p:spPr>
+      </p:pic>
+    </p:spTree>
+    <p:extLst>
+      <p:ext uri="{BB962C8B-B14F-4D97-AF65-F5344CB8AC3E}">
+        <p14:creationId xmlns:p14="http://schemas.microsoft.com/office/powerpoint/2010/main" val="3717948777"/>
+      </p:ext>
+    </p:extLst>
+  </p:cSld>
+  <p:clrMapOvr>
+    <a:masterClrMapping/>
+  </p:clrMapOvr>
+</p:sld>
+</file>
+
+<file path=ppt/slides/slide16.xml><?xml version="1.0" encoding="utf-8"?>
+<p:sld xmlns:a="http://schemas.openxmlformats.org/drawingml/2006/main" xmlns:r="http://schemas.openxmlformats.org/officeDocument/2006/relationships" xmlns:p="http://schemas.openxmlformats.org/presentationml/2006/main">
+  <p:cSld>
+    <p:spTree>
+      <p:nvGrpSpPr>
         <p:cNvPr id="1" name="Shape 304"/>
         <p:cNvGrpSpPr/>
         <p:nvPr/>
@@ -23211,7 +23419,7 @@
 </p:sld>
 </file>
 
-<file path=ppt/slides/slide16.xml><?xml version="1.0" encoding="utf-8"?>
+<file path=ppt/slides/slide17.xml><?xml version="1.0" encoding="utf-8"?>
 <p:sld xmlns:a="http://schemas.openxmlformats.org/drawingml/2006/main" xmlns:r="http://schemas.openxmlformats.org/officeDocument/2006/relationships" xmlns:p="http://schemas.openxmlformats.org/presentationml/2006/main">
   <p:cSld>
     <p:spTree>
@@ -23266,8 +23474,8 @@
           </a:p>
         </p:txBody>
       </p:sp>
-      <mc:AlternateContent xmlns:mc="http://schemas.openxmlformats.org/markup-compatibility/2006">
-        <mc:Choice xmlns:a14="http://schemas.microsoft.com/office/drawing/2010/main" Requires="a14">
+      <mc:AlternateContent xmlns:mc="http://schemas.openxmlformats.org/markup-compatibility/2006" xmlns:a14="http://schemas.microsoft.com/office/drawing/2010/main">
+        <mc:Choice Requires="a14">
           <p:sp>
             <p:nvSpPr>
               <p:cNvPr id="7" name="Google Shape;311;p57">
@@ -25215,7 +25423,7 @@
             </p:txBody>
           </p:sp>
         </mc:Choice>
-        <mc:Fallback>
+        <mc:Fallback xmlns="">
           <p:sp>
             <p:nvSpPr>
               <p:cNvPr id="7" name="Google Shape;311;p57">
@@ -25275,7 +25483,7 @@
 </p:sld>
 </file>
 
-<file path=ppt/slides/slide17.xml><?xml version="1.0" encoding="utf-8"?>
+<file path=ppt/slides/slide18.xml><?xml version="1.0" encoding="utf-8"?>
 <p:sld xmlns:a="http://schemas.openxmlformats.org/drawingml/2006/main" xmlns:r="http://schemas.openxmlformats.org/officeDocument/2006/relationships" xmlns:p="http://schemas.openxmlformats.org/presentationml/2006/main">
   <p:cSld>
     <p:spTree>
@@ -25509,7 +25717,7 @@
 </p:sld>
 </file>
 
-<file path=ppt/slides/slide18.xml><?xml version="1.0" encoding="utf-8"?>
+<file path=ppt/slides/slide19.xml><?xml version="1.0" encoding="utf-8"?>
 <p:sld xmlns:a="http://schemas.openxmlformats.org/drawingml/2006/main" xmlns:r="http://schemas.openxmlformats.org/officeDocument/2006/relationships" xmlns:p="http://schemas.openxmlformats.org/presentationml/2006/main">
   <p:cSld>
     <p:spTree>
@@ -27079,7 +27287,272 @@
 </p:sld>
 </file>
 
-<file path=ppt/slides/slide19.xml><?xml version="1.0" encoding="utf-8"?>
+<file path=ppt/slides/slide2.xml><?xml version="1.0" encoding="utf-8"?>
+<p:sld xmlns:a="http://schemas.openxmlformats.org/drawingml/2006/main" xmlns:r="http://schemas.openxmlformats.org/officeDocument/2006/relationships" xmlns:p="http://schemas.openxmlformats.org/presentationml/2006/main">
+  <p:cSld>
+    <p:spTree>
+      <p:nvGrpSpPr>
+        <p:cNvPr id="1" name="Shape 194"/>
+        <p:cNvGrpSpPr/>
+        <p:nvPr/>
+      </p:nvGrpSpPr>
+      <p:grpSpPr>
+        <a:xfrm>
+          <a:off x="0" y="0"/>
+          <a:ext cx="0" cy="0"/>
+          <a:chOff x="0" y="0"/>
+          <a:chExt cx="0" cy="0"/>
+        </a:xfrm>
+      </p:grpSpPr>
+      <p:sp>
+        <p:nvSpPr>
+          <p:cNvPr id="195" name="Google Shape;195;p47"/>
+          <p:cNvSpPr txBox="1">
+            <a:spLocks noGrp="1"/>
+          </p:cNvSpPr>
+          <p:nvPr>
+            <p:ph type="title"/>
+          </p:nvPr>
+        </p:nvSpPr>
+        <p:spPr>
+          <a:xfrm>
+            <a:off x="1635875" y="772125"/>
+            <a:ext cx="7935300" cy="841800"/>
+          </a:xfrm>
+          <a:prstGeom prst="rect">
+            <a:avLst/>
+          </a:prstGeom>
+        </p:spPr>
+        <p:txBody>
+          <a:bodyPr spcFirstLastPara="1" wrap="square" lIns="91425" tIns="91425" rIns="91425" bIns="91425" anchor="ctr" anchorCtr="0">
+            <a:noAutofit/>
+          </a:bodyPr>
+          <a:lstStyle/>
+          <a:p>
+            <a:pPr marL="0" lvl="0" indent="0" algn="l" rtl="0">
+              <a:spcBef>
+                <a:spcPts val="0"/>
+              </a:spcBef>
+              <a:spcAft>
+                <a:spcPts val="0"/>
+              </a:spcAft>
+              <a:buNone/>
+            </a:pPr>
+            <a:r>
+              <a:rPr lang="ru" sz="2100"/>
+              <a:t>Проверить, идет ли запись</a:t>
+            </a:r>
+            <a:endParaRPr sz="2100"/>
+          </a:p>
+        </p:txBody>
+      </p:sp>
+      <p:sp>
+        <p:nvSpPr>
+          <p:cNvPr id="196" name="Google Shape;196;p47"/>
+          <p:cNvSpPr txBox="1">
+            <a:spLocks noGrp="1"/>
+          </p:cNvSpPr>
+          <p:nvPr>
+            <p:ph type="title"/>
+          </p:nvPr>
+        </p:nvSpPr>
+        <p:spPr>
+          <a:xfrm>
+            <a:off x="766725" y="1805199"/>
+            <a:ext cx="7935300" cy="1295700"/>
+          </a:xfrm>
+          <a:prstGeom prst="rect">
+            <a:avLst/>
+          </a:prstGeom>
+        </p:spPr>
+        <p:txBody>
+          <a:bodyPr spcFirstLastPara="1" wrap="square" lIns="91425" tIns="91425" rIns="91425" bIns="91425" anchor="ctr" anchorCtr="0">
+            <a:noAutofit/>
+          </a:bodyPr>
+          <a:lstStyle/>
+          <a:p>
+            <a:pPr marL="0" lvl="0" indent="0" algn="l" rtl="0">
+              <a:spcBef>
+                <a:spcPts val="0"/>
+              </a:spcBef>
+              <a:spcAft>
+                <a:spcPts val="0"/>
+              </a:spcAft>
+              <a:buClr>
+                <a:schemeClr val="dk1"/>
+              </a:buClr>
+              <a:buSzPts val="1100"/>
+              <a:buFont typeface="Arial"/>
+              <a:buNone/>
+            </a:pPr>
+            <a:r>
+              <a:rPr lang="ru" sz="4000"/>
+              <a:t>Меня хорошо видно</a:t>
+            </a:r>
+            <a:endParaRPr sz="4000"/>
+          </a:p>
+          <a:p>
+            <a:pPr marL="0" lvl="0" indent="0" algn="l" rtl="0">
+              <a:spcBef>
+                <a:spcPts val="0"/>
+              </a:spcBef>
+              <a:spcAft>
+                <a:spcPts val="0"/>
+              </a:spcAft>
+              <a:buNone/>
+            </a:pPr>
+            <a:r>
+              <a:rPr lang="ru" sz="4000"/>
+              <a:t>&amp;&amp; слышно?</a:t>
+            </a:r>
+            <a:endParaRPr sz="4000"/>
+          </a:p>
+        </p:txBody>
+      </p:sp>
+      <p:pic>
+        <p:nvPicPr>
+          <p:cNvPr id="197" name="Google Shape;197;p47"/>
+          <p:cNvPicPr preferRelativeResize="0"/>
+          <p:nvPr/>
+        </p:nvPicPr>
+        <p:blipFill rotWithShape="1">
+          <a:blip r:embed="rId3">
+            <a:alphaModFix/>
+          </a:blip>
+          <a:srcRect l="99" r="99"/>
+          <a:stretch/>
+        </p:blipFill>
+        <p:spPr>
+          <a:xfrm>
+            <a:off x="880825" y="1032408"/>
+            <a:ext cx="642317" cy="321159"/>
+          </a:xfrm>
+          <a:prstGeom prst="rect">
+            <a:avLst/>
+          </a:prstGeom>
+          <a:noFill/>
+          <a:ln>
+            <a:noFill/>
+          </a:ln>
+        </p:spPr>
+      </p:pic>
+      <p:pic>
+        <p:nvPicPr>
+          <p:cNvPr id="198" name="Google Shape;198;p47"/>
+          <p:cNvPicPr preferRelativeResize="0"/>
+          <p:nvPr/>
+        </p:nvPicPr>
+        <p:blipFill rotWithShape="1">
+          <a:blip r:embed="rId4">
+            <a:alphaModFix/>
+          </a:blip>
+          <a:srcRect/>
+          <a:stretch/>
+        </p:blipFill>
+        <p:spPr>
+          <a:xfrm>
+            <a:off x="872375" y="3520050"/>
+            <a:ext cx="525600" cy="525600"/>
+          </a:xfrm>
+          <a:prstGeom prst="rect">
+            <a:avLst/>
+          </a:prstGeom>
+          <a:noFill/>
+          <a:ln>
+            <a:noFill/>
+          </a:ln>
+        </p:spPr>
+      </p:pic>
+      <p:sp>
+        <p:nvSpPr>
+          <p:cNvPr id="199" name="Google Shape;199;p47"/>
+          <p:cNvSpPr txBox="1"/>
+          <p:nvPr/>
+        </p:nvSpPr>
+        <p:spPr>
+          <a:xfrm>
+            <a:off x="1514225" y="3459600"/>
+            <a:ext cx="3000000" cy="646500"/>
+          </a:xfrm>
+          <a:prstGeom prst="rect">
+            <a:avLst/>
+          </a:prstGeom>
+          <a:noFill/>
+          <a:ln>
+            <a:noFill/>
+          </a:ln>
+        </p:spPr>
+        <p:txBody>
+          <a:bodyPr spcFirstLastPara="1" wrap="square" lIns="91425" tIns="91425" rIns="91425" bIns="91425" anchor="t" anchorCtr="0">
+            <a:spAutoFit/>
+          </a:bodyPr>
+          <a:lstStyle/>
+          <a:p>
+            <a:pPr marL="0" lvl="0" indent="0" algn="l" rtl="0">
+              <a:spcBef>
+                <a:spcPts val="0"/>
+              </a:spcBef>
+              <a:spcAft>
+                <a:spcPts val="0"/>
+              </a:spcAft>
+              <a:buNone/>
+            </a:pPr>
+            <a:r>
+              <a:rPr lang="ru" sz="1500">
+                <a:solidFill>
+                  <a:schemeClr val="dk1"/>
+                </a:solidFill>
+                <a:latin typeface="Roboto"/>
+                <a:ea typeface="Roboto"/>
+                <a:cs typeface="Roboto"/>
+                <a:sym typeface="Roboto"/>
+              </a:rPr>
+              <a:t>Ставим “+”, если все хорошо</a:t>
+            </a:r>
+            <a:br>
+              <a:rPr lang="ru" sz="1500">
+                <a:solidFill>
+                  <a:schemeClr val="dk1"/>
+                </a:solidFill>
+                <a:latin typeface="Roboto"/>
+                <a:ea typeface="Roboto"/>
+                <a:cs typeface="Roboto"/>
+                <a:sym typeface="Roboto"/>
+              </a:rPr>
+            </a:br>
+            <a:r>
+              <a:rPr lang="ru" sz="1500">
+                <a:solidFill>
+                  <a:schemeClr val="dk1"/>
+                </a:solidFill>
+                <a:latin typeface="Roboto"/>
+                <a:ea typeface="Roboto"/>
+                <a:cs typeface="Roboto"/>
+                <a:sym typeface="Roboto"/>
+              </a:rPr>
+              <a:t>“-”, если есть проблемы</a:t>
+            </a:r>
+            <a:endParaRPr sz="1500">
+              <a:solidFill>
+                <a:schemeClr val="dk1"/>
+              </a:solidFill>
+              <a:latin typeface="Roboto"/>
+              <a:ea typeface="Roboto"/>
+              <a:cs typeface="Roboto"/>
+              <a:sym typeface="Roboto"/>
+            </a:endParaRPr>
+          </a:p>
+        </p:txBody>
+      </p:sp>
+    </p:spTree>
+  </p:cSld>
+  <p:clrMapOvr>
+    <a:masterClrMapping/>
+  </p:clrMapOvr>
+</p:sld>
+</file>
+
+<file path=ppt/slides/slide20.xml><?xml version="1.0" encoding="utf-8"?>
 <p:sld xmlns:a="http://schemas.openxmlformats.org/drawingml/2006/main" xmlns:r="http://schemas.openxmlformats.org/officeDocument/2006/relationships" xmlns:p="http://schemas.openxmlformats.org/presentationml/2006/main">
   <p:cSld>
     <p:spTree>
@@ -28642,272 +29115,7 @@
 </p:sld>
 </file>
 
-<file path=ppt/slides/slide2.xml><?xml version="1.0" encoding="utf-8"?>
-<p:sld xmlns:a="http://schemas.openxmlformats.org/drawingml/2006/main" xmlns:r="http://schemas.openxmlformats.org/officeDocument/2006/relationships" xmlns:p="http://schemas.openxmlformats.org/presentationml/2006/main">
-  <p:cSld>
-    <p:spTree>
-      <p:nvGrpSpPr>
-        <p:cNvPr id="1" name="Shape 194"/>
-        <p:cNvGrpSpPr/>
-        <p:nvPr/>
-      </p:nvGrpSpPr>
-      <p:grpSpPr>
-        <a:xfrm>
-          <a:off x="0" y="0"/>
-          <a:ext cx="0" cy="0"/>
-          <a:chOff x="0" y="0"/>
-          <a:chExt cx="0" cy="0"/>
-        </a:xfrm>
-      </p:grpSpPr>
-      <p:sp>
-        <p:nvSpPr>
-          <p:cNvPr id="195" name="Google Shape;195;p47"/>
-          <p:cNvSpPr txBox="1">
-            <a:spLocks noGrp="1"/>
-          </p:cNvSpPr>
-          <p:nvPr>
-            <p:ph type="title"/>
-          </p:nvPr>
-        </p:nvSpPr>
-        <p:spPr>
-          <a:xfrm>
-            <a:off x="1635875" y="772125"/>
-            <a:ext cx="7935300" cy="841800"/>
-          </a:xfrm>
-          <a:prstGeom prst="rect">
-            <a:avLst/>
-          </a:prstGeom>
-        </p:spPr>
-        <p:txBody>
-          <a:bodyPr spcFirstLastPara="1" wrap="square" lIns="91425" tIns="91425" rIns="91425" bIns="91425" anchor="ctr" anchorCtr="0">
-            <a:noAutofit/>
-          </a:bodyPr>
-          <a:lstStyle/>
-          <a:p>
-            <a:pPr marL="0" lvl="0" indent="0" algn="l" rtl="0">
-              <a:spcBef>
-                <a:spcPts val="0"/>
-              </a:spcBef>
-              <a:spcAft>
-                <a:spcPts val="0"/>
-              </a:spcAft>
-              <a:buNone/>
-            </a:pPr>
-            <a:r>
-              <a:rPr lang="ru" sz="2100"/>
-              <a:t>Проверить, идет ли запись</a:t>
-            </a:r>
-            <a:endParaRPr sz="2100"/>
-          </a:p>
-        </p:txBody>
-      </p:sp>
-      <p:sp>
-        <p:nvSpPr>
-          <p:cNvPr id="196" name="Google Shape;196;p47"/>
-          <p:cNvSpPr txBox="1">
-            <a:spLocks noGrp="1"/>
-          </p:cNvSpPr>
-          <p:nvPr>
-            <p:ph type="title"/>
-          </p:nvPr>
-        </p:nvSpPr>
-        <p:spPr>
-          <a:xfrm>
-            <a:off x="766725" y="1805199"/>
-            <a:ext cx="7935300" cy="1295700"/>
-          </a:xfrm>
-          <a:prstGeom prst="rect">
-            <a:avLst/>
-          </a:prstGeom>
-        </p:spPr>
-        <p:txBody>
-          <a:bodyPr spcFirstLastPara="1" wrap="square" lIns="91425" tIns="91425" rIns="91425" bIns="91425" anchor="ctr" anchorCtr="0">
-            <a:noAutofit/>
-          </a:bodyPr>
-          <a:lstStyle/>
-          <a:p>
-            <a:pPr marL="0" lvl="0" indent="0" algn="l" rtl="0">
-              <a:spcBef>
-                <a:spcPts val="0"/>
-              </a:spcBef>
-              <a:spcAft>
-                <a:spcPts val="0"/>
-              </a:spcAft>
-              <a:buClr>
-                <a:schemeClr val="dk1"/>
-              </a:buClr>
-              <a:buSzPts val="1100"/>
-              <a:buFont typeface="Arial"/>
-              <a:buNone/>
-            </a:pPr>
-            <a:r>
-              <a:rPr lang="ru" sz="4000"/>
-              <a:t>Меня хорошо видно</a:t>
-            </a:r>
-            <a:endParaRPr sz="4000"/>
-          </a:p>
-          <a:p>
-            <a:pPr marL="0" lvl="0" indent="0" algn="l" rtl="0">
-              <a:spcBef>
-                <a:spcPts val="0"/>
-              </a:spcBef>
-              <a:spcAft>
-                <a:spcPts val="0"/>
-              </a:spcAft>
-              <a:buNone/>
-            </a:pPr>
-            <a:r>
-              <a:rPr lang="ru" sz="4000"/>
-              <a:t>&amp;&amp; слышно?</a:t>
-            </a:r>
-            <a:endParaRPr sz="4000"/>
-          </a:p>
-        </p:txBody>
-      </p:sp>
-      <p:pic>
-        <p:nvPicPr>
-          <p:cNvPr id="197" name="Google Shape;197;p47"/>
-          <p:cNvPicPr preferRelativeResize="0"/>
-          <p:nvPr/>
-        </p:nvPicPr>
-        <p:blipFill rotWithShape="1">
-          <a:blip r:embed="rId3">
-            <a:alphaModFix/>
-          </a:blip>
-          <a:srcRect l="99" r="99"/>
-          <a:stretch/>
-        </p:blipFill>
-        <p:spPr>
-          <a:xfrm>
-            <a:off x="880825" y="1032408"/>
-            <a:ext cx="642317" cy="321159"/>
-          </a:xfrm>
-          <a:prstGeom prst="rect">
-            <a:avLst/>
-          </a:prstGeom>
-          <a:noFill/>
-          <a:ln>
-            <a:noFill/>
-          </a:ln>
-        </p:spPr>
-      </p:pic>
-      <p:pic>
-        <p:nvPicPr>
-          <p:cNvPr id="198" name="Google Shape;198;p47"/>
-          <p:cNvPicPr preferRelativeResize="0"/>
-          <p:nvPr/>
-        </p:nvPicPr>
-        <p:blipFill rotWithShape="1">
-          <a:blip r:embed="rId4">
-            <a:alphaModFix/>
-          </a:blip>
-          <a:srcRect/>
-          <a:stretch/>
-        </p:blipFill>
-        <p:spPr>
-          <a:xfrm>
-            <a:off x="872375" y="3520050"/>
-            <a:ext cx="525600" cy="525600"/>
-          </a:xfrm>
-          <a:prstGeom prst="rect">
-            <a:avLst/>
-          </a:prstGeom>
-          <a:noFill/>
-          <a:ln>
-            <a:noFill/>
-          </a:ln>
-        </p:spPr>
-      </p:pic>
-      <p:sp>
-        <p:nvSpPr>
-          <p:cNvPr id="199" name="Google Shape;199;p47"/>
-          <p:cNvSpPr txBox="1"/>
-          <p:nvPr/>
-        </p:nvSpPr>
-        <p:spPr>
-          <a:xfrm>
-            <a:off x="1514225" y="3459600"/>
-            <a:ext cx="3000000" cy="646500"/>
-          </a:xfrm>
-          <a:prstGeom prst="rect">
-            <a:avLst/>
-          </a:prstGeom>
-          <a:noFill/>
-          <a:ln>
-            <a:noFill/>
-          </a:ln>
-        </p:spPr>
-        <p:txBody>
-          <a:bodyPr spcFirstLastPara="1" wrap="square" lIns="91425" tIns="91425" rIns="91425" bIns="91425" anchor="t" anchorCtr="0">
-            <a:spAutoFit/>
-          </a:bodyPr>
-          <a:lstStyle/>
-          <a:p>
-            <a:pPr marL="0" lvl="0" indent="0" algn="l" rtl="0">
-              <a:spcBef>
-                <a:spcPts val="0"/>
-              </a:spcBef>
-              <a:spcAft>
-                <a:spcPts val="0"/>
-              </a:spcAft>
-              <a:buNone/>
-            </a:pPr>
-            <a:r>
-              <a:rPr lang="ru" sz="1500">
-                <a:solidFill>
-                  <a:schemeClr val="dk1"/>
-                </a:solidFill>
-                <a:latin typeface="Roboto"/>
-                <a:ea typeface="Roboto"/>
-                <a:cs typeface="Roboto"/>
-                <a:sym typeface="Roboto"/>
-              </a:rPr>
-              <a:t>Ставим “+”, если все хорошо</a:t>
-            </a:r>
-            <a:br>
-              <a:rPr lang="ru" sz="1500">
-                <a:solidFill>
-                  <a:schemeClr val="dk1"/>
-                </a:solidFill>
-                <a:latin typeface="Roboto"/>
-                <a:ea typeface="Roboto"/>
-                <a:cs typeface="Roboto"/>
-                <a:sym typeface="Roboto"/>
-              </a:rPr>
-            </a:br>
-            <a:r>
-              <a:rPr lang="ru" sz="1500">
-                <a:solidFill>
-                  <a:schemeClr val="dk1"/>
-                </a:solidFill>
-                <a:latin typeface="Roboto"/>
-                <a:ea typeface="Roboto"/>
-                <a:cs typeface="Roboto"/>
-                <a:sym typeface="Roboto"/>
-              </a:rPr>
-              <a:t>“-”, если есть проблемы</a:t>
-            </a:r>
-            <a:endParaRPr sz="1500">
-              <a:solidFill>
-                <a:schemeClr val="dk1"/>
-              </a:solidFill>
-              <a:latin typeface="Roboto"/>
-              <a:ea typeface="Roboto"/>
-              <a:cs typeface="Roboto"/>
-              <a:sym typeface="Roboto"/>
-            </a:endParaRPr>
-          </a:p>
-        </p:txBody>
-      </p:sp>
-    </p:spTree>
-  </p:cSld>
-  <p:clrMapOvr>
-    <a:masterClrMapping/>
-  </p:clrMapOvr>
-</p:sld>
-</file>
-
-<file path=ppt/slides/slide20.xml><?xml version="1.0" encoding="utf-8"?>
+<file path=ppt/slides/slide21.xml><?xml version="1.0" encoding="utf-8"?>
 <p:sld xmlns:a="http://schemas.openxmlformats.org/drawingml/2006/main" xmlns:r="http://schemas.openxmlformats.org/officeDocument/2006/relationships" xmlns:p="http://schemas.openxmlformats.org/presentationml/2006/main">
   <p:cSld>
     <p:spTree>
@@ -29005,7 +29213,7 @@
 </p:sld>
 </file>
 
-<file path=ppt/slides/slide21.xml><?xml version="1.0" encoding="utf-8"?>
+<file path=ppt/slides/slide22.xml><?xml version="1.0" encoding="utf-8"?>
 <p:sld xmlns:a="http://schemas.openxmlformats.org/drawingml/2006/main" xmlns:r="http://schemas.openxmlformats.org/officeDocument/2006/relationships" xmlns:p="http://schemas.openxmlformats.org/presentationml/2006/main">
   <p:cSld>
     <p:spTree>
@@ -30807,7 +31015,7 @@
 </p:sld>
 </file>
 
-<file path=ppt/slides/slide22.xml><?xml version="1.0" encoding="utf-8"?>
+<file path=ppt/slides/slide23.xml><?xml version="1.0" encoding="utf-8"?>
 <p:sld xmlns:a="http://schemas.openxmlformats.org/drawingml/2006/main" xmlns:r="http://schemas.openxmlformats.org/officeDocument/2006/relationships" xmlns:p="http://schemas.openxmlformats.org/presentationml/2006/main">
   <p:cSld>
     <p:spTree>
@@ -30874,7 +31082,7 @@
 </p:sld>
 </file>
 
-<file path=ppt/slides/slide23.xml><?xml version="1.0" encoding="utf-8"?>
+<file path=ppt/slides/slide24.xml><?xml version="1.0" encoding="utf-8"?>
 <p:sld xmlns:a="http://schemas.openxmlformats.org/drawingml/2006/main" xmlns:r="http://schemas.openxmlformats.org/officeDocument/2006/relationships" xmlns:p="http://schemas.openxmlformats.org/presentationml/2006/main">
   <p:cSld>
     <p:spTree>
@@ -31356,7 +31564,7 @@
 </p:sld>
 </file>
 
-<file path=ppt/slides/slide24.xml><?xml version="1.0" encoding="utf-8"?>
+<file path=ppt/slides/slide25.xml><?xml version="1.0" encoding="utf-8"?>
 <p:sld xmlns:a="http://schemas.openxmlformats.org/drawingml/2006/main" xmlns:r="http://schemas.openxmlformats.org/officeDocument/2006/relationships" xmlns:p="http://schemas.openxmlformats.org/presentationml/2006/main">
   <p:cSld>
     <p:spTree>
@@ -32142,7 +32350,7 @@
 </p:sld>
 </file>
 
-<file path=ppt/slides/slide25.xml><?xml version="1.0" encoding="utf-8"?>
+<file path=ppt/slides/slide26.xml><?xml version="1.0" encoding="utf-8"?>
 <p:sld xmlns:a="http://schemas.openxmlformats.org/drawingml/2006/main" xmlns:r="http://schemas.openxmlformats.org/officeDocument/2006/relationships" xmlns:p="http://schemas.openxmlformats.org/presentationml/2006/main">
   <p:cSld>
     <p:spTree>
@@ -32348,7 +32556,7 @@
 </p:sld>
 </file>
 
-<file path=ppt/slides/slide26.xml><?xml version="1.0" encoding="utf-8"?>
+<file path=ppt/slides/slide27.xml><?xml version="1.0" encoding="utf-8"?>
 <p:sld xmlns:a="http://schemas.openxmlformats.org/drawingml/2006/main" xmlns:r="http://schemas.openxmlformats.org/officeDocument/2006/relationships" xmlns:p="http://schemas.openxmlformats.org/presentationml/2006/main">
   <p:cSld>
     <p:spTree>
@@ -32649,7 +32857,7 @@
 </p:sld>
 </file>
 
-<file path=ppt/slides/slide27.xml><?xml version="1.0" encoding="utf-8"?>
+<file path=ppt/slides/slide28.xml><?xml version="1.0" encoding="utf-8"?>
 <p:sld xmlns:a="http://schemas.openxmlformats.org/drawingml/2006/main" xmlns:r="http://schemas.openxmlformats.org/officeDocument/2006/relationships" xmlns:p="http://schemas.openxmlformats.org/presentationml/2006/main">
   <p:cSld>
     <p:spTree>
@@ -32716,7 +32924,7 @@
 </p:sld>
 </file>
 
-<file path=ppt/slides/slide28.xml><?xml version="1.0" encoding="utf-8"?>
+<file path=ppt/slides/slide29.xml><?xml version="1.0" encoding="utf-8"?>
 <p:sld xmlns:a="http://schemas.openxmlformats.org/drawingml/2006/main" xmlns:r="http://schemas.openxmlformats.org/officeDocument/2006/relationships" xmlns:p="http://schemas.openxmlformats.org/presentationml/2006/main">
   <p:cSld>
     <p:spTree>
@@ -33479,275 +33687,6 @@
 </p:sld>
 </file>
 
-<file path=ppt/slides/slide29.xml><?xml version="1.0" encoding="utf-8"?>
-<p:sld xmlns:a="http://schemas.openxmlformats.org/drawingml/2006/main" xmlns:r="http://schemas.openxmlformats.org/officeDocument/2006/relationships" xmlns:p="http://schemas.openxmlformats.org/presentationml/2006/main">
-  <p:cSld>
-    <p:spTree>
-      <p:nvGrpSpPr>
-        <p:cNvPr id="1" name="Shape 449"/>
-        <p:cNvGrpSpPr/>
-        <p:nvPr/>
-      </p:nvGrpSpPr>
-      <p:grpSpPr>
-        <a:xfrm>
-          <a:off x="0" y="0"/>
-          <a:ext cx="0" cy="0"/>
-          <a:chOff x="0" y="0"/>
-          <a:chExt cx="0" cy="0"/>
-        </a:xfrm>
-      </p:grpSpPr>
-      <p:sp>
-        <p:nvSpPr>
-          <p:cNvPr id="450" name="Google Shape;450;p77"/>
-          <p:cNvSpPr txBox="1">
-            <a:spLocks noGrp="1"/>
-          </p:cNvSpPr>
-          <p:nvPr>
-            <p:ph type="title"/>
-          </p:nvPr>
-        </p:nvSpPr>
-        <p:spPr>
-          <a:xfrm>
-            <a:off x="500550" y="330724"/>
-            <a:ext cx="8520600" cy="1095900"/>
-          </a:xfrm>
-          <a:prstGeom prst="rect">
-            <a:avLst/>
-          </a:prstGeom>
-        </p:spPr>
-        <p:txBody>
-          <a:bodyPr spcFirstLastPara="1" wrap="square" lIns="91425" tIns="91425" rIns="91425" bIns="91425" anchor="t" anchorCtr="0">
-            <a:noAutofit/>
-          </a:bodyPr>
-          <a:lstStyle/>
-          <a:p>
-            <a:pPr marL="0" lvl="0" indent="0" algn="l" rtl="0">
-              <a:spcBef>
-                <a:spcPts val="0"/>
-              </a:spcBef>
-              <a:spcAft>
-                <a:spcPts val="0"/>
-              </a:spcAft>
-              <a:buNone/>
-            </a:pPr>
-            <a:r>
-              <a:rPr lang="ru"/>
-              <a:t>Рефлексия</a:t>
-            </a:r>
-            <a:endParaRPr/>
-          </a:p>
-        </p:txBody>
-      </p:sp>
-      <p:pic>
-        <p:nvPicPr>
-          <p:cNvPr id="451" name="Google Shape;451;p77"/>
-          <p:cNvPicPr preferRelativeResize="0"/>
-          <p:nvPr/>
-        </p:nvPicPr>
-        <p:blipFill rotWithShape="1">
-          <a:blip r:embed="rId3">
-            <a:alphaModFix/>
-          </a:blip>
-          <a:srcRect/>
-          <a:stretch/>
-        </p:blipFill>
-        <p:spPr>
-          <a:xfrm>
-            <a:off x="633114" y="2019850"/>
-            <a:ext cx="828522" cy="828504"/>
-          </a:xfrm>
-          <a:prstGeom prst="rect">
-            <a:avLst/>
-          </a:prstGeom>
-          <a:noFill/>
-          <a:ln>
-            <a:noFill/>
-          </a:ln>
-        </p:spPr>
-      </p:pic>
-      <p:sp>
-        <p:nvSpPr>
-          <p:cNvPr id="452" name="Google Shape;452;p77"/>
-          <p:cNvSpPr txBox="1"/>
-          <p:nvPr/>
-        </p:nvSpPr>
-        <p:spPr>
-          <a:xfrm>
-            <a:off x="1700240" y="2226352"/>
-            <a:ext cx="4672200" cy="415500"/>
-          </a:xfrm>
-          <a:prstGeom prst="rect">
-            <a:avLst/>
-          </a:prstGeom>
-          <a:noFill/>
-          <a:ln>
-            <a:noFill/>
-          </a:ln>
-        </p:spPr>
-        <p:txBody>
-          <a:bodyPr spcFirstLastPara="1" wrap="square" lIns="91425" tIns="91425" rIns="91425" bIns="91425" anchor="t" anchorCtr="0">
-            <a:spAutoFit/>
-          </a:bodyPr>
-          <a:lstStyle/>
-          <a:p>
-            <a:pPr marL="0" lvl="0" indent="0" algn="l" rtl="0">
-              <a:spcBef>
-                <a:spcPts val="0"/>
-              </a:spcBef>
-              <a:spcAft>
-                <a:spcPts val="0"/>
-              </a:spcAft>
-              <a:buNone/>
-            </a:pPr>
-            <a:r>
-              <a:rPr lang="ru" sz="1500" dirty="0">
-                <a:solidFill>
-                  <a:schemeClr val="dk1"/>
-                </a:solidFill>
-                <a:latin typeface="Roboto"/>
-                <a:ea typeface="Roboto"/>
-                <a:cs typeface="Roboto"/>
-                <a:sym typeface="Roboto"/>
-              </a:rPr>
-              <a:t>С какими впечатлениями уходите с вебинара?</a:t>
-            </a:r>
-            <a:endParaRPr sz="1500" dirty="0">
-              <a:solidFill>
-                <a:schemeClr val="dk1"/>
-              </a:solidFill>
-              <a:latin typeface="Roboto"/>
-              <a:ea typeface="Roboto"/>
-              <a:cs typeface="Roboto"/>
-              <a:sym typeface="Roboto"/>
-            </a:endParaRPr>
-          </a:p>
-        </p:txBody>
-      </p:sp>
-      <p:sp>
-        <p:nvSpPr>
-          <p:cNvPr id="453" name="Google Shape;453;p77"/>
-          <p:cNvSpPr txBox="1"/>
-          <p:nvPr/>
-        </p:nvSpPr>
-        <p:spPr>
-          <a:xfrm>
-            <a:off x="1700240" y="3414189"/>
-            <a:ext cx="4996800" cy="646500"/>
-          </a:xfrm>
-          <a:prstGeom prst="rect">
-            <a:avLst/>
-          </a:prstGeom>
-          <a:noFill/>
-          <a:ln>
-            <a:noFill/>
-          </a:ln>
-        </p:spPr>
-        <p:txBody>
-          <a:bodyPr spcFirstLastPara="1" wrap="square" lIns="91425" tIns="91425" rIns="91425" bIns="91425" anchor="t" anchorCtr="0">
-            <a:spAutoFit/>
-          </a:bodyPr>
-          <a:lstStyle/>
-          <a:p>
-            <a:pPr marL="0" lvl="0" indent="0" algn="l" rtl="0">
-              <a:spcBef>
-                <a:spcPts val="0"/>
-              </a:spcBef>
-              <a:spcAft>
-                <a:spcPts val="0"/>
-              </a:spcAft>
-              <a:buNone/>
-            </a:pPr>
-            <a:r>
-              <a:rPr lang="ru" sz="1500">
-                <a:solidFill>
-                  <a:schemeClr val="dk1"/>
-                </a:solidFill>
-                <a:latin typeface="Roboto"/>
-                <a:ea typeface="Roboto"/>
-                <a:cs typeface="Roboto"/>
-                <a:sym typeface="Roboto"/>
-              </a:rPr>
-              <a:t>Как будете применять на практике то,</a:t>
-            </a:r>
-            <a:endParaRPr sz="1500">
-              <a:solidFill>
-                <a:schemeClr val="dk1"/>
-              </a:solidFill>
-              <a:latin typeface="Roboto"/>
-              <a:ea typeface="Roboto"/>
-              <a:cs typeface="Roboto"/>
-              <a:sym typeface="Roboto"/>
-            </a:endParaRPr>
-          </a:p>
-          <a:p>
-            <a:pPr marL="0" lvl="0" indent="0" algn="l" rtl="0">
-              <a:spcBef>
-                <a:spcPts val="0"/>
-              </a:spcBef>
-              <a:spcAft>
-                <a:spcPts val="0"/>
-              </a:spcAft>
-              <a:buNone/>
-            </a:pPr>
-            <a:r>
-              <a:rPr lang="ru" sz="1500">
-                <a:solidFill>
-                  <a:schemeClr val="dk1"/>
-                </a:solidFill>
-                <a:latin typeface="Roboto"/>
-                <a:ea typeface="Roboto"/>
-                <a:cs typeface="Roboto"/>
-                <a:sym typeface="Roboto"/>
-              </a:rPr>
-              <a:t>что узнали на вебинаре?</a:t>
-            </a:r>
-            <a:endParaRPr sz="1500">
-              <a:solidFill>
-                <a:schemeClr val="dk1"/>
-              </a:solidFill>
-              <a:latin typeface="Roboto"/>
-              <a:ea typeface="Roboto"/>
-              <a:cs typeface="Roboto"/>
-              <a:sym typeface="Roboto"/>
-            </a:endParaRPr>
-          </a:p>
-        </p:txBody>
-      </p:sp>
-      <p:pic>
-        <p:nvPicPr>
-          <p:cNvPr id="454" name="Google Shape;454;p77"/>
-          <p:cNvPicPr preferRelativeResize="0"/>
-          <p:nvPr/>
-        </p:nvPicPr>
-        <p:blipFill rotWithShape="1">
-          <a:blip r:embed="rId4">
-            <a:alphaModFix/>
-          </a:blip>
-          <a:srcRect/>
-          <a:stretch/>
-        </p:blipFill>
-        <p:spPr>
-          <a:xfrm>
-            <a:off x="621950" y="3330152"/>
-            <a:ext cx="845250" cy="845249"/>
-          </a:xfrm>
-          <a:prstGeom prst="rect">
-            <a:avLst/>
-          </a:prstGeom>
-          <a:noFill/>
-          <a:ln>
-            <a:noFill/>
-          </a:ln>
-        </p:spPr>
-      </p:pic>
-    </p:spTree>
-  </p:cSld>
-  <p:clrMapOvr>
-    <a:masterClrMapping/>
-  </p:clrMapOvr>
-</p:sld>
-</file>
-
 <file path=ppt/slides/slide3.xml><?xml version="1.0" encoding="utf-8"?>
 <p:sld xmlns:a="http://schemas.openxmlformats.org/drawingml/2006/main" xmlns:r="http://schemas.openxmlformats.org/officeDocument/2006/relationships" xmlns:p="http://schemas.openxmlformats.org/presentationml/2006/main">
   <p:cSld>
@@ -34979,6 +34918,275 @@
   <p:cSld>
     <p:spTree>
       <p:nvGrpSpPr>
+        <p:cNvPr id="1" name="Shape 449"/>
+        <p:cNvGrpSpPr/>
+        <p:nvPr/>
+      </p:nvGrpSpPr>
+      <p:grpSpPr>
+        <a:xfrm>
+          <a:off x="0" y="0"/>
+          <a:ext cx="0" cy="0"/>
+          <a:chOff x="0" y="0"/>
+          <a:chExt cx="0" cy="0"/>
+        </a:xfrm>
+      </p:grpSpPr>
+      <p:sp>
+        <p:nvSpPr>
+          <p:cNvPr id="450" name="Google Shape;450;p77"/>
+          <p:cNvSpPr txBox="1">
+            <a:spLocks noGrp="1"/>
+          </p:cNvSpPr>
+          <p:nvPr>
+            <p:ph type="title"/>
+          </p:nvPr>
+        </p:nvSpPr>
+        <p:spPr>
+          <a:xfrm>
+            <a:off x="500550" y="330724"/>
+            <a:ext cx="8520600" cy="1095900"/>
+          </a:xfrm>
+          <a:prstGeom prst="rect">
+            <a:avLst/>
+          </a:prstGeom>
+        </p:spPr>
+        <p:txBody>
+          <a:bodyPr spcFirstLastPara="1" wrap="square" lIns="91425" tIns="91425" rIns="91425" bIns="91425" anchor="t" anchorCtr="0">
+            <a:noAutofit/>
+          </a:bodyPr>
+          <a:lstStyle/>
+          <a:p>
+            <a:pPr marL="0" lvl="0" indent="0" algn="l" rtl="0">
+              <a:spcBef>
+                <a:spcPts val="0"/>
+              </a:spcBef>
+              <a:spcAft>
+                <a:spcPts val="0"/>
+              </a:spcAft>
+              <a:buNone/>
+            </a:pPr>
+            <a:r>
+              <a:rPr lang="ru"/>
+              <a:t>Рефлексия</a:t>
+            </a:r>
+            <a:endParaRPr/>
+          </a:p>
+        </p:txBody>
+      </p:sp>
+      <p:pic>
+        <p:nvPicPr>
+          <p:cNvPr id="451" name="Google Shape;451;p77"/>
+          <p:cNvPicPr preferRelativeResize="0"/>
+          <p:nvPr/>
+        </p:nvPicPr>
+        <p:blipFill rotWithShape="1">
+          <a:blip r:embed="rId3">
+            <a:alphaModFix/>
+          </a:blip>
+          <a:srcRect/>
+          <a:stretch/>
+        </p:blipFill>
+        <p:spPr>
+          <a:xfrm>
+            <a:off x="633114" y="2019850"/>
+            <a:ext cx="828522" cy="828504"/>
+          </a:xfrm>
+          <a:prstGeom prst="rect">
+            <a:avLst/>
+          </a:prstGeom>
+          <a:noFill/>
+          <a:ln>
+            <a:noFill/>
+          </a:ln>
+        </p:spPr>
+      </p:pic>
+      <p:sp>
+        <p:nvSpPr>
+          <p:cNvPr id="452" name="Google Shape;452;p77"/>
+          <p:cNvSpPr txBox="1"/>
+          <p:nvPr/>
+        </p:nvSpPr>
+        <p:spPr>
+          <a:xfrm>
+            <a:off x="1700240" y="2226352"/>
+            <a:ext cx="4672200" cy="415500"/>
+          </a:xfrm>
+          <a:prstGeom prst="rect">
+            <a:avLst/>
+          </a:prstGeom>
+          <a:noFill/>
+          <a:ln>
+            <a:noFill/>
+          </a:ln>
+        </p:spPr>
+        <p:txBody>
+          <a:bodyPr spcFirstLastPara="1" wrap="square" lIns="91425" tIns="91425" rIns="91425" bIns="91425" anchor="t" anchorCtr="0">
+            <a:spAutoFit/>
+          </a:bodyPr>
+          <a:lstStyle/>
+          <a:p>
+            <a:pPr marL="0" lvl="0" indent="0" algn="l" rtl="0">
+              <a:spcBef>
+                <a:spcPts val="0"/>
+              </a:spcBef>
+              <a:spcAft>
+                <a:spcPts val="0"/>
+              </a:spcAft>
+              <a:buNone/>
+            </a:pPr>
+            <a:r>
+              <a:rPr lang="ru" sz="1500" dirty="0">
+                <a:solidFill>
+                  <a:schemeClr val="dk1"/>
+                </a:solidFill>
+                <a:latin typeface="Roboto"/>
+                <a:ea typeface="Roboto"/>
+                <a:cs typeface="Roboto"/>
+                <a:sym typeface="Roboto"/>
+              </a:rPr>
+              <a:t>С какими впечатлениями уходите с вебинара?</a:t>
+            </a:r>
+            <a:endParaRPr sz="1500" dirty="0">
+              <a:solidFill>
+                <a:schemeClr val="dk1"/>
+              </a:solidFill>
+              <a:latin typeface="Roboto"/>
+              <a:ea typeface="Roboto"/>
+              <a:cs typeface="Roboto"/>
+              <a:sym typeface="Roboto"/>
+            </a:endParaRPr>
+          </a:p>
+        </p:txBody>
+      </p:sp>
+      <p:sp>
+        <p:nvSpPr>
+          <p:cNvPr id="453" name="Google Shape;453;p77"/>
+          <p:cNvSpPr txBox="1"/>
+          <p:nvPr/>
+        </p:nvSpPr>
+        <p:spPr>
+          <a:xfrm>
+            <a:off x="1700240" y="3414189"/>
+            <a:ext cx="4996800" cy="646500"/>
+          </a:xfrm>
+          <a:prstGeom prst="rect">
+            <a:avLst/>
+          </a:prstGeom>
+          <a:noFill/>
+          <a:ln>
+            <a:noFill/>
+          </a:ln>
+        </p:spPr>
+        <p:txBody>
+          <a:bodyPr spcFirstLastPara="1" wrap="square" lIns="91425" tIns="91425" rIns="91425" bIns="91425" anchor="t" anchorCtr="0">
+            <a:spAutoFit/>
+          </a:bodyPr>
+          <a:lstStyle/>
+          <a:p>
+            <a:pPr marL="0" lvl="0" indent="0" algn="l" rtl="0">
+              <a:spcBef>
+                <a:spcPts val="0"/>
+              </a:spcBef>
+              <a:spcAft>
+                <a:spcPts val="0"/>
+              </a:spcAft>
+              <a:buNone/>
+            </a:pPr>
+            <a:r>
+              <a:rPr lang="ru" sz="1500">
+                <a:solidFill>
+                  <a:schemeClr val="dk1"/>
+                </a:solidFill>
+                <a:latin typeface="Roboto"/>
+                <a:ea typeface="Roboto"/>
+                <a:cs typeface="Roboto"/>
+                <a:sym typeface="Roboto"/>
+              </a:rPr>
+              <a:t>Как будете применять на практике то,</a:t>
+            </a:r>
+            <a:endParaRPr sz="1500">
+              <a:solidFill>
+                <a:schemeClr val="dk1"/>
+              </a:solidFill>
+              <a:latin typeface="Roboto"/>
+              <a:ea typeface="Roboto"/>
+              <a:cs typeface="Roboto"/>
+              <a:sym typeface="Roboto"/>
+            </a:endParaRPr>
+          </a:p>
+          <a:p>
+            <a:pPr marL="0" lvl="0" indent="0" algn="l" rtl="0">
+              <a:spcBef>
+                <a:spcPts val="0"/>
+              </a:spcBef>
+              <a:spcAft>
+                <a:spcPts val="0"/>
+              </a:spcAft>
+              <a:buNone/>
+            </a:pPr>
+            <a:r>
+              <a:rPr lang="ru" sz="1500">
+                <a:solidFill>
+                  <a:schemeClr val="dk1"/>
+                </a:solidFill>
+                <a:latin typeface="Roboto"/>
+                <a:ea typeface="Roboto"/>
+                <a:cs typeface="Roboto"/>
+                <a:sym typeface="Roboto"/>
+              </a:rPr>
+              <a:t>что узнали на вебинаре?</a:t>
+            </a:r>
+            <a:endParaRPr sz="1500">
+              <a:solidFill>
+                <a:schemeClr val="dk1"/>
+              </a:solidFill>
+              <a:latin typeface="Roboto"/>
+              <a:ea typeface="Roboto"/>
+              <a:cs typeface="Roboto"/>
+              <a:sym typeface="Roboto"/>
+            </a:endParaRPr>
+          </a:p>
+        </p:txBody>
+      </p:sp>
+      <p:pic>
+        <p:nvPicPr>
+          <p:cNvPr id="454" name="Google Shape;454;p77"/>
+          <p:cNvPicPr preferRelativeResize="0"/>
+          <p:nvPr/>
+        </p:nvPicPr>
+        <p:blipFill rotWithShape="1">
+          <a:blip r:embed="rId4">
+            <a:alphaModFix/>
+          </a:blip>
+          <a:srcRect/>
+          <a:stretch/>
+        </p:blipFill>
+        <p:spPr>
+          <a:xfrm>
+            <a:off x="621950" y="3330152"/>
+            <a:ext cx="845250" cy="845249"/>
+          </a:xfrm>
+          <a:prstGeom prst="rect">
+            <a:avLst/>
+          </a:prstGeom>
+          <a:noFill/>
+          <a:ln>
+            <a:noFill/>
+          </a:ln>
+        </p:spPr>
+      </p:pic>
+    </p:spTree>
+  </p:cSld>
+  <p:clrMapOvr>
+    <a:masterClrMapping/>
+  </p:clrMapOvr>
+</p:sld>
+</file>
+
+<file path=ppt/slides/slide31.xml><?xml version="1.0" encoding="utf-8"?>
+<p:sld xmlns:a="http://schemas.openxmlformats.org/drawingml/2006/main" xmlns:r="http://schemas.openxmlformats.org/officeDocument/2006/relationships" xmlns:p="http://schemas.openxmlformats.org/presentationml/2006/main">
+  <p:cSld>
+    <p:spTree>
+      <p:nvGrpSpPr>
         <p:cNvPr id="1" name="Shape 474"/>
         <p:cNvGrpSpPr/>
         <p:nvPr/>
@@ -35078,7 +35286,7 @@
 </p:sld>
 </file>
 
-<file path=ppt/slides/slide31.xml><?xml version="1.0" encoding="utf-8"?>
+<file path=ppt/slides/slide32.xml><?xml version="1.0" encoding="utf-8"?>
 <p:sld xmlns:a="http://schemas.openxmlformats.org/drawingml/2006/main" xmlns:r="http://schemas.openxmlformats.org/officeDocument/2006/relationships" xmlns:p="http://schemas.openxmlformats.org/presentationml/2006/main">
   <p:cSld>
     <p:spTree>

</xml_diff>